<commit_message>
Grobkonzept angepasst und Beispiel für MVC hinzugefügt
</commit_message>
<xml_diff>
--- a/Dokumentation/grobkonzept.pptx
+++ b/Dokumentation/grobkonzept.pptx
@@ -108,6 +108,11 @@
       </a:defRPr>
     </a:lvl9pPr>
   </p:defaultTextStyle>
+  <p:extLst>
+    <p:ext uri="{EFAFB233-063F-42B5-8137-9DF3F51BA10A}">
+      <p15:sldGuideLst xmlns:p15="http://schemas.microsoft.com/office/powerpoint/2012/main"/>
+    </p:ext>
+  </p:extLst>
 </p:presentation>
 </file>
 
@@ -3988,8 +3993,8 @@
         </p:nvSpPr>
         <p:spPr>
           <a:xfrm>
-            <a:off x="5912521" y="1829449"/>
-            <a:ext cx="684699" cy="369332"/>
+            <a:off x="5330002" y="1546596"/>
+            <a:ext cx="1878337" cy="646331"/>
           </a:xfrm>
           <a:prstGeom prst="rect">
             <a:avLst/>
@@ -4018,7 +4023,14 @@
                   </a:schemeClr>
                 </a:solidFill>
               </a:rPr>
-              <a:t>App</a:t>
+              <a:t>App / </a:t>
+            </a:r>
+          </a:p>
+          <a:p>
+            <a:pPr algn="ctr"/>
+            <a:r>
+              <a:rPr lang="de-DE" dirty="0"/>
+              <a:t>.NET-Anwendung</a:t>
             </a:r>
           </a:p>
         </p:txBody>
@@ -4381,8 +4393,8 @@
         </p:nvCxnSpPr>
         <p:spPr>
           <a:xfrm>
-            <a:off x="6254871" y="2198781"/>
-            <a:ext cx="353609" cy="2041277"/>
+            <a:off x="6269171" y="2192927"/>
+            <a:ext cx="339309" cy="2047131"/>
           </a:xfrm>
           <a:prstGeom prst="straightConnector1">
             <a:avLst/>
@@ -4458,10 +4470,10 @@
       </p:cxnSp>
       <p:cxnSp>
         <p:nvCxnSpPr>
-          <p:cNvPr id="58" name="Gerade Verbindung mit Pfeil 57">
-            <a:extLst>
-              <a:ext uri="{FF2B5EF4-FFF2-40B4-BE49-F238E27FC236}">
-                <a16:creationId xmlns:a16="http://schemas.microsoft.com/office/drawing/2014/main" id="{399441E0-896A-4397-BA09-88FFD887B2BB}"/>
+          <p:cNvPr id="66" name="Gerade Verbindung mit Pfeil 65">
+            <a:extLst>
+              <a:ext uri="{FF2B5EF4-FFF2-40B4-BE49-F238E27FC236}">
+                <a16:creationId xmlns:a16="http://schemas.microsoft.com/office/drawing/2014/main" id="{6CD1BD5A-F1AA-4EA8-9A17-63A00337CCC6}"/>
               </a:ext>
             </a:extLst>
           </p:cNvPr>
@@ -4472,15 +4484,17 @@
         </p:nvCxnSpPr>
         <p:spPr>
           <a:xfrm>
-            <a:off x="4262504" y="3577035"/>
-            <a:ext cx="0" cy="668877"/>
+            <a:off x="4515348" y="3577035"/>
+            <a:ext cx="1623965" cy="663023"/>
           </a:xfrm>
           <a:prstGeom prst="straightConnector1">
             <a:avLst/>
           </a:prstGeom>
           <a:ln>
             <a:solidFill>
-              <a:schemeClr val="tx1"/>
+              <a:schemeClr val="bg1">
+                <a:lumMod val="65000"/>
+              </a:schemeClr>
             </a:solidFill>
             <a:tailEnd type="triangle"/>
           </a:ln>
@@ -4500,52 +4514,6 @@
           </a:fontRef>
         </p:style>
       </p:cxnSp>
-      <p:cxnSp>
-        <p:nvCxnSpPr>
-          <p:cNvPr id="66" name="Gerade Verbindung mit Pfeil 65">
-            <a:extLst>
-              <a:ext uri="{FF2B5EF4-FFF2-40B4-BE49-F238E27FC236}">
-                <a16:creationId xmlns:a16="http://schemas.microsoft.com/office/drawing/2014/main" id="{6CD1BD5A-F1AA-4EA8-9A17-63A00337CCC6}"/>
-              </a:ext>
-            </a:extLst>
-          </p:cNvPr>
-          <p:cNvCxnSpPr>
-            <a:cxnSpLocks/>
-          </p:cNvCxnSpPr>
-          <p:nvPr/>
-        </p:nvCxnSpPr>
-        <p:spPr>
-          <a:xfrm>
-            <a:off x="4515348" y="3577035"/>
-            <a:ext cx="1623965" cy="663023"/>
-          </a:xfrm>
-          <a:prstGeom prst="straightConnector1">
-            <a:avLst/>
-          </a:prstGeom>
-          <a:ln>
-            <a:solidFill>
-              <a:schemeClr val="bg1">
-                <a:lumMod val="65000"/>
-              </a:schemeClr>
-            </a:solidFill>
-            <a:tailEnd type="triangle"/>
-          </a:ln>
-        </p:spPr>
-        <p:style>
-          <a:lnRef idx="1">
-            <a:schemeClr val="accent1"/>
-          </a:lnRef>
-          <a:fillRef idx="0">
-            <a:schemeClr val="accent1"/>
-          </a:fillRef>
-          <a:effectRef idx="0">
-            <a:schemeClr val="accent1"/>
-          </a:effectRef>
-          <a:fontRef idx="minor">
-            <a:schemeClr val="tx1"/>
-          </a:fontRef>
-        </p:style>
-      </p:cxnSp>
       <p:sp>
         <p:nvSpPr>
           <p:cNvPr id="71" name="Textfeld 70">
@@ -4625,43 +4593,6 @@
             <a:r>
               <a:rPr lang="de-DE" sz="1200" dirty="0"/>
               <a:t>liest ab</a:t>
-            </a:r>
-          </a:p>
-        </p:txBody>
-      </p:sp>
-      <p:sp>
-        <p:nvSpPr>
-          <p:cNvPr id="73" name="Textfeld 72">
-            <a:extLst>
-              <a:ext uri="{FF2B5EF4-FFF2-40B4-BE49-F238E27FC236}">
-                <a16:creationId xmlns:a16="http://schemas.microsoft.com/office/drawing/2014/main" id="{BF032A10-CD9D-4A02-981E-5E5320E65BD5}"/>
-              </a:ext>
-            </a:extLst>
-          </p:cNvPr>
-          <p:cNvSpPr txBox="1"/>
-          <p:nvPr/>
-        </p:nvSpPr>
-        <p:spPr>
-          <a:xfrm>
-            <a:off x="3837067" y="3746964"/>
-            <a:ext cx="850874" cy="276999"/>
-          </a:xfrm>
-          <a:prstGeom prst="rect">
-            <a:avLst/>
-          </a:prstGeom>
-          <a:solidFill>
-            <a:schemeClr val="bg1"/>
-          </a:solidFill>
-        </p:spPr>
-        <p:txBody>
-          <a:bodyPr wrap="none" rtlCol="0">
-            <a:spAutoFit/>
-          </a:bodyPr>
-          <a:lstStyle/>
-          <a:p>
-            <a:r>
-              <a:rPr lang="de-DE" sz="1200" dirty="0"/>
-              <a:t>wertet aus</a:t>
             </a:r>
           </a:p>
         </p:txBody>
@@ -5409,227 +5340,801 @@
           <a:chExt cx="0" cy="0"/>
         </a:xfrm>
       </p:grpSpPr>
-      <p:sp>
-        <p:nvSpPr>
-          <p:cNvPr id="3" name="Inhaltsplatzhalter 2">
-            <a:extLst>
-              <a:ext uri="{FF2B5EF4-FFF2-40B4-BE49-F238E27FC236}">
-                <a16:creationId xmlns:a16="http://schemas.microsoft.com/office/drawing/2014/main" id="{5E916D66-A7C0-4ED1-8BF1-26BCD7CAB649}"/>
-              </a:ext>
-            </a:extLst>
-          </p:cNvPr>
-          <p:cNvSpPr>
-            <a:spLocks noGrp="1"/>
-          </p:cNvSpPr>
-          <p:nvPr>
-            <p:ph idx="1"/>
-          </p:nvPr>
+      <p:cxnSp>
+        <p:nvCxnSpPr>
+          <p:cNvPr id="23" name="Gerade Verbindung mit Pfeil 22">
+            <a:extLst>
+              <a:ext uri="{FF2B5EF4-FFF2-40B4-BE49-F238E27FC236}">
+                <a16:creationId xmlns:a16="http://schemas.microsoft.com/office/drawing/2014/main" id="{437CF2BE-3DB6-4B17-BDE8-CC3A79E2BA2B}"/>
+              </a:ext>
+            </a:extLst>
+          </p:cNvPr>
+          <p:cNvCxnSpPr>
+            <a:cxnSpLocks/>
+          </p:cNvCxnSpPr>
+          <p:nvPr/>
+        </p:nvCxnSpPr>
+        <p:spPr>
+          <a:xfrm flipV="1">
+            <a:off x="6982901" y="2296498"/>
+            <a:ext cx="0" cy="1459845"/>
+          </a:xfrm>
+          <a:prstGeom prst="straightConnector1">
+            <a:avLst/>
+          </a:prstGeom>
+          <a:ln>
+            <a:solidFill>
+              <a:schemeClr val="tx1"/>
+            </a:solidFill>
+            <a:tailEnd type="triangle"/>
+          </a:ln>
+        </p:spPr>
+        <p:style>
+          <a:lnRef idx="1">
+            <a:schemeClr val="accent1"/>
+          </a:lnRef>
+          <a:fillRef idx="0">
+            <a:schemeClr val="accent1"/>
+          </a:fillRef>
+          <a:effectRef idx="0">
+            <a:schemeClr val="accent1"/>
+          </a:effectRef>
+          <a:fontRef idx="minor">
+            <a:schemeClr val="tx1"/>
+          </a:fontRef>
+        </p:style>
+      </p:cxnSp>
+      <p:sp>
+        <p:nvSpPr>
+          <p:cNvPr id="4" name="Textfeld 3">
+            <a:extLst>
+              <a:ext uri="{FF2B5EF4-FFF2-40B4-BE49-F238E27FC236}">
+                <a16:creationId xmlns:a16="http://schemas.microsoft.com/office/drawing/2014/main" id="{346A0033-46F8-4110-9F62-AE0A96139854}"/>
+              </a:ext>
+            </a:extLst>
+          </p:cNvPr>
+          <p:cNvSpPr txBox="1"/>
+          <p:nvPr/>
         </p:nvSpPr>
         <p:spPr>
           <a:xfrm>
-            <a:off x="838200" y="715617"/>
-            <a:ext cx="10515600" cy="5461346"/>
-          </a:xfrm>
-        </p:spPr>
-        <p:txBody>
-          <a:bodyPr>
-            <a:normAutofit/>
+            <a:off x="5644995" y="3756343"/>
+            <a:ext cx="1582171" cy="369332"/>
+          </a:xfrm>
+          <a:prstGeom prst="rect">
+            <a:avLst/>
+          </a:prstGeom>
+          <a:noFill/>
+          <a:ln>
+            <a:solidFill>
+              <a:schemeClr val="tx1"/>
+            </a:solidFill>
+          </a:ln>
+        </p:spPr>
+        <p:txBody>
+          <a:bodyPr wrap="square" rtlCol="0">
+            <a:spAutoFit/>
           </a:bodyPr>
           <a:lstStyle/>
           <a:p>
-            <a:pPr marL="0" indent="0">
+            <a:pPr algn="ctr"/>
+            <a:r>
+              <a:rPr lang="de-DE" dirty="0" err="1"/>
+              <a:t>ContentModel</a:t>
+            </a:r>
+            <a:endParaRPr lang="de-DE" dirty="0"/>
+          </a:p>
+        </p:txBody>
+      </p:sp>
+      <p:sp>
+        <p:nvSpPr>
+          <p:cNvPr id="5" name="Textfeld 4">
+            <a:extLst>
+              <a:ext uri="{FF2B5EF4-FFF2-40B4-BE49-F238E27FC236}">
+                <a16:creationId xmlns:a16="http://schemas.microsoft.com/office/drawing/2014/main" id="{226EBA3A-37B7-4CBE-B092-5A184FC6244B}"/>
+              </a:ext>
+            </a:extLst>
+          </p:cNvPr>
+          <p:cNvSpPr txBox="1"/>
+          <p:nvPr/>
+        </p:nvSpPr>
+        <p:spPr>
+          <a:xfrm>
+            <a:off x="5684743" y="5002021"/>
+            <a:ext cx="1506325" cy="369332"/>
+          </a:xfrm>
+          <a:prstGeom prst="rect">
+            <a:avLst/>
+          </a:prstGeom>
+          <a:noFill/>
+          <a:ln>
+            <a:solidFill>
+              <a:schemeClr val="tx1"/>
+            </a:solidFill>
+          </a:ln>
+        </p:spPr>
+        <p:txBody>
+          <a:bodyPr wrap="square" rtlCol="0">
+            <a:spAutoFit/>
+          </a:bodyPr>
+          <a:lstStyle/>
+          <a:p>
+            <a:pPr algn="ctr"/>
+            <a:r>
+              <a:rPr lang="de-DE" dirty="0" err="1"/>
+              <a:t>DBContent</a:t>
+            </a:r>
+            <a:endParaRPr lang="de-DE" dirty="0"/>
+          </a:p>
+        </p:txBody>
+      </p:sp>
+      <p:sp>
+        <p:nvSpPr>
+          <p:cNvPr id="7" name="Textfeld 6">
+            <a:extLst>
+              <a:ext uri="{FF2B5EF4-FFF2-40B4-BE49-F238E27FC236}">
+                <a16:creationId xmlns:a16="http://schemas.microsoft.com/office/drawing/2014/main" id="{9C54E40F-4152-4A1C-B6D4-4DD5869479CF}"/>
+              </a:ext>
+            </a:extLst>
+          </p:cNvPr>
+          <p:cNvSpPr txBox="1"/>
+          <p:nvPr/>
+        </p:nvSpPr>
+        <p:spPr>
+          <a:xfrm>
+            <a:off x="3148279" y="2841754"/>
+            <a:ext cx="1506325" cy="646331"/>
+          </a:xfrm>
+          <a:prstGeom prst="rect">
+            <a:avLst/>
+          </a:prstGeom>
+          <a:noFill/>
+          <a:ln>
+            <a:solidFill>
+              <a:schemeClr val="tx1"/>
+            </a:solidFill>
+          </a:ln>
+        </p:spPr>
+        <p:txBody>
+          <a:bodyPr wrap="square" rtlCol="0">
+            <a:spAutoFit/>
+          </a:bodyPr>
+          <a:lstStyle/>
+          <a:p>
+            <a:pPr algn="ctr"/>
+            <a:r>
+              <a:rPr lang="de-DE" dirty="0"/>
+              <a:t>Content-Controller</a:t>
+            </a:r>
+          </a:p>
+        </p:txBody>
+      </p:sp>
+      <p:sp>
+        <p:nvSpPr>
+          <p:cNvPr id="8" name="Textfeld 7">
+            <a:extLst>
+              <a:ext uri="{FF2B5EF4-FFF2-40B4-BE49-F238E27FC236}">
+                <a16:creationId xmlns:a16="http://schemas.microsoft.com/office/drawing/2014/main" id="{7A1A861F-4705-422C-82AB-101CE4CB717E}"/>
+              </a:ext>
+            </a:extLst>
+          </p:cNvPr>
+          <p:cNvSpPr txBox="1"/>
+          <p:nvPr/>
+        </p:nvSpPr>
+        <p:spPr>
+          <a:xfrm>
+            <a:off x="5556247" y="1930460"/>
+            <a:ext cx="1829240" cy="369332"/>
+          </a:xfrm>
+          <a:prstGeom prst="rect">
+            <a:avLst/>
+          </a:prstGeom>
+          <a:noFill/>
+          <a:ln>
+            <a:solidFill>
+              <a:schemeClr val="tx1"/>
+            </a:solidFill>
+          </a:ln>
+        </p:spPr>
+        <p:txBody>
+          <a:bodyPr wrap="square" rtlCol="0">
+            <a:spAutoFit/>
+          </a:bodyPr>
+          <a:lstStyle/>
+          <a:p>
+            <a:pPr algn="ctr"/>
+            <a:r>
+              <a:rPr lang="de-DE" dirty="0" err="1"/>
+              <a:t>NETContentView</a:t>
+            </a:r>
+            <a:endParaRPr lang="de-DE" dirty="0"/>
+          </a:p>
+        </p:txBody>
+      </p:sp>
+      <p:cxnSp>
+        <p:nvCxnSpPr>
+          <p:cNvPr id="9" name="Gerade Verbindung mit Pfeil 8">
+            <a:extLst>
+              <a:ext uri="{FF2B5EF4-FFF2-40B4-BE49-F238E27FC236}">
+                <a16:creationId xmlns:a16="http://schemas.microsoft.com/office/drawing/2014/main" id="{A8F370D4-6A4C-460B-B9D4-8A5F9FD0C4B2}"/>
+              </a:ext>
+            </a:extLst>
+          </p:cNvPr>
+          <p:cNvCxnSpPr>
+            <a:cxnSpLocks/>
+          </p:cNvCxnSpPr>
+          <p:nvPr/>
+        </p:nvCxnSpPr>
+        <p:spPr>
+          <a:xfrm>
+            <a:off x="6021576" y="2296498"/>
+            <a:ext cx="1" cy="1459845"/>
+          </a:xfrm>
+          <a:prstGeom prst="straightConnector1">
+            <a:avLst/>
+          </a:prstGeom>
+          <a:ln>
+            <a:solidFill>
+              <a:schemeClr val="tx1"/>
+            </a:solidFill>
+            <a:tailEnd type="triangle"/>
+          </a:ln>
+        </p:spPr>
+        <p:style>
+          <a:lnRef idx="1">
+            <a:schemeClr val="accent1"/>
+          </a:lnRef>
+          <a:fillRef idx="0">
+            <a:schemeClr val="accent1"/>
+          </a:fillRef>
+          <a:effectRef idx="0">
+            <a:schemeClr val="accent1"/>
+          </a:effectRef>
+          <a:fontRef idx="minor">
+            <a:schemeClr val="tx1"/>
+          </a:fontRef>
+        </p:style>
+      </p:cxnSp>
+      <p:sp>
+        <p:nvSpPr>
+          <p:cNvPr id="10" name="Textfeld 9">
+            <a:extLst>
+              <a:ext uri="{FF2B5EF4-FFF2-40B4-BE49-F238E27FC236}">
+                <a16:creationId xmlns:a16="http://schemas.microsoft.com/office/drawing/2014/main" id="{84F9E493-7382-485E-8A85-52640AB5F59F}"/>
+              </a:ext>
+            </a:extLst>
+          </p:cNvPr>
+          <p:cNvSpPr txBox="1"/>
+          <p:nvPr/>
+        </p:nvSpPr>
+        <p:spPr>
+          <a:xfrm>
+            <a:off x="5644995" y="2819080"/>
+            <a:ext cx="753161" cy="276999"/>
+          </a:xfrm>
+          <a:prstGeom prst="rect">
+            <a:avLst/>
+          </a:prstGeom>
+          <a:solidFill>
+            <a:schemeClr val="bg1"/>
+          </a:solidFill>
+        </p:spPr>
+        <p:txBody>
+          <a:bodyPr wrap="square" rtlCol="0">
+            <a:spAutoFit/>
+          </a:bodyPr>
+          <a:lstStyle/>
+          <a:p>
+            <a:r>
+              <a:rPr lang="de-DE" sz="1200" dirty="0"/>
+              <a:t>stellt dar</a:t>
+            </a:r>
+          </a:p>
+        </p:txBody>
+      </p:sp>
+      <p:cxnSp>
+        <p:nvCxnSpPr>
+          <p:cNvPr id="13" name="Gerade Verbindung mit Pfeil 12">
+            <a:extLst>
+              <a:ext uri="{FF2B5EF4-FFF2-40B4-BE49-F238E27FC236}">
+                <a16:creationId xmlns:a16="http://schemas.microsoft.com/office/drawing/2014/main" id="{5E9A1D74-5958-4133-ABB7-765501CA8E2F}"/>
+              </a:ext>
+            </a:extLst>
+          </p:cNvPr>
+          <p:cNvCxnSpPr>
+            <a:cxnSpLocks/>
+            <a:stCxn id="8" idx="1"/>
+            <a:endCxn id="7" idx="0"/>
+          </p:cNvCxnSpPr>
+          <p:nvPr/>
+        </p:nvCxnSpPr>
+        <p:spPr>
+          <a:xfrm flipH="1">
+            <a:off x="3901442" y="2115126"/>
+            <a:ext cx="1654805" cy="726628"/>
+          </a:xfrm>
+          <a:prstGeom prst="straightConnector1">
+            <a:avLst/>
+          </a:prstGeom>
+          <a:ln>
+            <a:solidFill>
+              <a:schemeClr val="tx1"/>
+            </a:solidFill>
+            <a:tailEnd type="triangle"/>
+          </a:ln>
+        </p:spPr>
+        <p:style>
+          <a:lnRef idx="1">
+            <a:schemeClr val="accent1"/>
+          </a:lnRef>
+          <a:fillRef idx="0">
+            <a:schemeClr val="accent1"/>
+          </a:fillRef>
+          <a:effectRef idx="0">
+            <a:schemeClr val="accent1"/>
+          </a:effectRef>
+          <a:fontRef idx="minor">
+            <a:schemeClr val="tx1"/>
+          </a:fontRef>
+        </p:style>
+      </p:cxnSp>
+      <p:sp>
+        <p:nvSpPr>
+          <p:cNvPr id="16" name="Textfeld 15">
+            <a:extLst>
+              <a:ext uri="{FF2B5EF4-FFF2-40B4-BE49-F238E27FC236}">
+                <a16:creationId xmlns:a16="http://schemas.microsoft.com/office/drawing/2014/main" id="{D7FF339C-1F77-4714-86F0-572DEDC1131F}"/>
+              </a:ext>
+            </a:extLst>
+          </p:cNvPr>
+          <p:cNvSpPr txBox="1"/>
+          <p:nvPr/>
+        </p:nvSpPr>
+        <p:spPr>
+          <a:xfrm>
+            <a:off x="3843151" y="2195423"/>
+            <a:ext cx="1658015" cy="461665"/>
+          </a:xfrm>
+          <a:prstGeom prst="rect">
+            <a:avLst/>
+          </a:prstGeom>
+          <a:solidFill>
+            <a:schemeClr val="bg1"/>
+          </a:solidFill>
+        </p:spPr>
+        <p:txBody>
+          <a:bodyPr wrap="square" rtlCol="0">
+            <a:spAutoFit/>
+          </a:bodyPr>
+          <a:lstStyle/>
+          <a:p>
+            <a:pPr algn="ctr"/>
+            <a:r>
+              <a:rPr lang="de-DE" sz="1200" dirty="0"/>
+              <a:t>Sendet Events</a:t>
+            </a:r>
+          </a:p>
+          <a:p>
+            <a:pPr algn="ctr"/>
+            <a:r>
+              <a:rPr lang="de-DE" sz="1200" dirty="0"/>
+              <a:t>(Bearbeitungsbefehle)</a:t>
+            </a:r>
+          </a:p>
+        </p:txBody>
+      </p:sp>
+      <p:cxnSp>
+        <p:nvCxnSpPr>
+          <p:cNvPr id="18" name="Gerade Verbindung mit Pfeil 17">
+            <a:extLst>
+              <a:ext uri="{FF2B5EF4-FFF2-40B4-BE49-F238E27FC236}">
+                <a16:creationId xmlns:a16="http://schemas.microsoft.com/office/drawing/2014/main" id="{7D08226C-1805-4586-8180-5E2B2418FD28}"/>
+              </a:ext>
+            </a:extLst>
+          </p:cNvPr>
+          <p:cNvCxnSpPr>
+            <a:cxnSpLocks/>
+            <a:stCxn id="7" idx="2"/>
+            <a:endCxn id="4" idx="1"/>
+          </p:cNvCxnSpPr>
+          <p:nvPr/>
+        </p:nvCxnSpPr>
+        <p:spPr>
+          <a:xfrm>
+            <a:off x="3901442" y="3488085"/>
+            <a:ext cx="1743553" cy="452924"/>
+          </a:xfrm>
+          <a:prstGeom prst="straightConnector1">
+            <a:avLst/>
+          </a:prstGeom>
+          <a:ln>
+            <a:solidFill>
+              <a:schemeClr val="tx1"/>
+            </a:solidFill>
+            <a:tailEnd type="triangle"/>
+          </a:ln>
+        </p:spPr>
+        <p:style>
+          <a:lnRef idx="1">
+            <a:schemeClr val="accent1"/>
+          </a:lnRef>
+          <a:fillRef idx="0">
+            <a:schemeClr val="accent1"/>
+          </a:fillRef>
+          <a:effectRef idx="0">
+            <a:schemeClr val="accent1"/>
+          </a:effectRef>
+          <a:fontRef idx="minor">
+            <a:schemeClr val="tx1"/>
+          </a:fontRef>
+        </p:style>
+      </p:cxnSp>
+      <p:sp>
+        <p:nvSpPr>
+          <p:cNvPr id="21" name="Textfeld 20">
+            <a:extLst>
+              <a:ext uri="{FF2B5EF4-FFF2-40B4-BE49-F238E27FC236}">
+                <a16:creationId xmlns:a16="http://schemas.microsoft.com/office/drawing/2014/main" id="{6EE8A25F-3C90-4B70-BA46-EFA3470CE458}"/>
+              </a:ext>
+            </a:extLst>
+          </p:cNvPr>
+          <p:cNvSpPr txBox="1"/>
+          <p:nvPr/>
+        </p:nvSpPr>
+        <p:spPr>
+          <a:xfrm>
+            <a:off x="3950884" y="3606800"/>
+            <a:ext cx="1658015" cy="276999"/>
+          </a:xfrm>
+          <a:prstGeom prst="rect">
+            <a:avLst/>
+          </a:prstGeom>
+          <a:solidFill>
+            <a:schemeClr val="bg1"/>
+          </a:solidFill>
+        </p:spPr>
+        <p:txBody>
+          <a:bodyPr wrap="square" rtlCol="0">
+            <a:spAutoFit/>
+          </a:bodyPr>
+          <a:lstStyle/>
+          <a:p>
+            <a:pPr algn="ctr"/>
+            <a:r>
+              <a:rPr lang="de-DE" sz="1200" dirty="0"/>
+              <a:t>bearbeitet</a:t>
+            </a:r>
+          </a:p>
+        </p:txBody>
+      </p:sp>
+      <p:sp>
+        <p:nvSpPr>
+          <p:cNvPr id="22" name="Textfeld 21">
+            <a:extLst>
+              <a:ext uri="{FF2B5EF4-FFF2-40B4-BE49-F238E27FC236}">
+                <a16:creationId xmlns:a16="http://schemas.microsoft.com/office/drawing/2014/main" id="{8D6C277A-9E9D-4876-A5EB-FB65E5AC7957}"/>
+              </a:ext>
+            </a:extLst>
+          </p:cNvPr>
+          <p:cNvSpPr txBox="1"/>
+          <p:nvPr/>
+        </p:nvSpPr>
+        <p:spPr>
+          <a:xfrm>
+            <a:off x="6543580" y="2810100"/>
+            <a:ext cx="884716" cy="276999"/>
+          </a:xfrm>
+          <a:prstGeom prst="rect">
+            <a:avLst/>
+          </a:prstGeom>
+          <a:solidFill>
+            <a:schemeClr val="bg1"/>
+          </a:solidFill>
+        </p:spPr>
+        <p:txBody>
+          <a:bodyPr wrap="square" rtlCol="0">
+            <a:spAutoFit/>
+          </a:bodyPr>
+          <a:lstStyle/>
+          <a:p>
+            <a:pPr algn="ctr"/>
+            <a:r>
+              <a:rPr lang="de-DE" sz="1200" dirty="0"/>
+              <a:t>aktualisiert</a:t>
+            </a:r>
+          </a:p>
+        </p:txBody>
+      </p:sp>
+      <p:cxnSp>
+        <p:nvCxnSpPr>
+          <p:cNvPr id="29" name="Gerade Verbindung mit Pfeil 28">
+            <a:extLst>
+              <a:ext uri="{FF2B5EF4-FFF2-40B4-BE49-F238E27FC236}">
+                <a16:creationId xmlns:a16="http://schemas.microsoft.com/office/drawing/2014/main" id="{F9B56FF1-812D-40B9-B8F2-9A81E1C89263}"/>
+              </a:ext>
+            </a:extLst>
+          </p:cNvPr>
+          <p:cNvCxnSpPr>
+            <a:cxnSpLocks/>
+            <a:stCxn id="4" idx="2"/>
+            <a:endCxn id="5" idx="0"/>
+          </p:cNvCxnSpPr>
+          <p:nvPr/>
+        </p:nvCxnSpPr>
+        <p:spPr>
+          <a:xfrm>
+            <a:off x="6436081" y="4125675"/>
+            <a:ext cx="1825" cy="876346"/>
+          </a:xfrm>
+          <a:prstGeom prst="straightConnector1">
+            <a:avLst/>
+          </a:prstGeom>
+          <a:ln>
+            <a:solidFill>
+              <a:schemeClr val="tx1"/>
+            </a:solidFill>
+            <a:tailEnd type="triangle"/>
+          </a:ln>
+        </p:spPr>
+        <p:style>
+          <a:lnRef idx="1">
+            <a:schemeClr val="accent1"/>
+          </a:lnRef>
+          <a:fillRef idx="0">
+            <a:schemeClr val="accent1"/>
+          </a:fillRef>
+          <a:effectRef idx="0">
+            <a:schemeClr val="accent1"/>
+          </a:effectRef>
+          <a:fontRef idx="minor">
+            <a:schemeClr val="tx1"/>
+          </a:fontRef>
+        </p:style>
+      </p:cxnSp>
+      <p:sp>
+        <p:nvSpPr>
+          <p:cNvPr id="31" name="Textfeld 30">
+            <a:extLst>
+              <a:ext uri="{FF2B5EF4-FFF2-40B4-BE49-F238E27FC236}">
+                <a16:creationId xmlns:a16="http://schemas.microsoft.com/office/drawing/2014/main" id="{D9390573-A2B6-4576-B2CF-C49C56FE5D4F}"/>
+              </a:ext>
+            </a:extLst>
+          </p:cNvPr>
+          <p:cNvSpPr txBox="1"/>
+          <p:nvPr/>
+        </p:nvSpPr>
+        <p:spPr>
+          <a:xfrm>
+            <a:off x="6021575" y="4310523"/>
+            <a:ext cx="898585" cy="461665"/>
+          </a:xfrm>
+          <a:prstGeom prst="rect">
+            <a:avLst/>
+          </a:prstGeom>
+          <a:solidFill>
+            <a:schemeClr val="bg1"/>
+          </a:solidFill>
+        </p:spPr>
+        <p:txBody>
+          <a:bodyPr wrap="square" rtlCol="0">
+            <a:spAutoFit/>
+          </a:bodyPr>
+          <a:lstStyle/>
+          <a:p>
+            <a:pPr algn="ctr"/>
+            <a:r>
+              <a:rPr lang="de-DE" sz="1200" dirty="0"/>
+              <a:t>speichert &amp; liest aus</a:t>
+            </a:r>
+          </a:p>
+        </p:txBody>
+      </p:sp>
+      <p:sp>
+        <p:nvSpPr>
+          <p:cNvPr id="42" name="Untertitel 2">
+            <a:extLst>
+              <a:ext uri="{FF2B5EF4-FFF2-40B4-BE49-F238E27FC236}">
+                <a16:creationId xmlns:a16="http://schemas.microsoft.com/office/drawing/2014/main" id="{D576A610-A3CB-44A0-96D7-C431D3416774}"/>
+              </a:ext>
+            </a:extLst>
+          </p:cNvPr>
+          <p:cNvSpPr txBox="1">
+            <a:spLocks/>
+          </p:cNvSpPr>
+          <p:nvPr/>
+        </p:nvSpPr>
+        <p:spPr>
+          <a:xfrm>
+            <a:off x="1524000" y="216405"/>
+            <a:ext cx="9144000" cy="419456"/>
+          </a:xfrm>
+          <a:prstGeom prst="rect">
+            <a:avLst/>
+          </a:prstGeom>
+        </p:spPr>
+        <p:txBody>
+          <a:bodyPr vert="horz" lIns="91440" tIns="45720" rIns="91440" bIns="45720" rtlCol="0">
+            <a:noAutofit/>
+          </a:bodyPr>
+          <a:lstStyle>
+            <a:lvl1pPr marL="228600" indent="-228600" algn="l" defTabSz="914400" rtl="0" eaLnBrk="1" latinLnBrk="0" hangingPunct="1">
+              <a:lnSpc>
+                <a:spcPct val="90000"/>
+              </a:lnSpc>
+              <a:spcBef>
+                <a:spcPts val="1000"/>
+              </a:spcBef>
+              <a:buFont typeface="Arial" panose="020B0604020202020204" pitchFamily="34" charset="0"/>
+              <a:buChar char="•"/>
+              <a:defRPr sz="2800" kern="1200">
+                <a:solidFill>
+                  <a:schemeClr val="tx1"/>
+                </a:solidFill>
+                <a:latin typeface="+mn-lt"/>
+                <a:ea typeface="+mn-ea"/>
+                <a:cs typeface="+mn-cs"/>
+              </a:defRPr>
+            </a:lvl1pPr>
+            <a:lvl2pPr marL="685800" indent="-228600" algn="l" defTabSz="914400" rtl="0" eaLnBrk="1" latinLnBrk="0" hangingPunct="1">
+              <a:lnSpc>
+                <a:spcPct val="90000"/>
+              </a:lnSpc>
+              <a:spcBef>
+                <a:spcPts val="500"/>
+              </a:spcBef>
+              <a:buFont typeface="Arial" panose="020B0604020202020204" pitchFamily="34" charset="0"/>
+              <a:buChar char="•"/>
+              <a:defRPr sz="2400" kern="1200">
+                <a:solidFill>
+                  <a:schemeClr val="tx1"/>
+                </a:solidFill>
+                <a:latin typeface="+mn-lt"/>
+                <a:ea typeface="+mn-ea"/>
+                <a:cs typeface="+mn-cs"/>
+              </a:defRPr>
+            </a:lvl2pPr>
+            <a:lvl3pPr marL="1143000" indent="-228600" algn="l" defTabSz="914400" rtl="0" eaLnBrk="1" latinLnBrk="0" hangingPunct="1">
+              <a:lnSpc>
+                <a:spcPct val="90000"/>
+              </a:lnSpc>
+              <a:spcBef>
+                <a:spcPts val="500"/>
+              </a:spcBef>
+              <a:buFont typeface="Arial" panose="020B0604020202020204" pitchFamily="34" charset="0"/>
+              <a:buChar char="•"/>
+              <a:defRPr sz="2000" kern="1200">
+                <a:solidFill>
+                  <a:schemeClr val="tx1"/>
+                </a:solidFill>
+                <a:latin typeface="+mn-lt"/>
+                <a:ea typeface="+mn-ea"/>
+                <a:cs typeface="+mn-cs"/>
+              </a:defRPr>
+            </a:lvl3pPr>
+            <a:lvl4pPr marL="1600200" indent="-228600" algn="l" defTabSz="914400" rtl="0" eaLnBrk="1" latinLnBrk="0" hangingPunct="1">
+              <a:lnSpc>
+                <a:spcPct val="90000"/>
+              </a:lnSpc>
+              <a:spcBef>
+                <a:spcPts val="500"/>
+              </a:spcBef>
+              <a:buFont typeface="Arial" panose="020B0604020202020204" pitchFamily="34" charset="0"/>
+              <a:buChar char="•"/>
+              <a:defRPr sz="1800" kern="1200">
+                <a:solidFill>
+                  <a:schemeClr val="tx1"/>
+                </a:solidFill>
+                <a:latin typeface="+mn-lt"/>
+                <a:ea typeface="+mn-ea"/>
+                <a:cs typeface="+mn-cs"/>
+              </a:defRPr>
+            </a:lvl4pPr>
+            <a:lvl5pPr marL="2057400" indent="-228600" algn="l" defTabSz="914400" rtl="0" eaLnBrk="1" latinLnBrk="0" hangingPunct="1">
+              <a:lnSpc>
+                <a:spcPct val="90000"/>
+              </a:lnSpc>
+              <a:spcBef>
+                <a:spcPts val="500"/>
+              </a:spcBef>
+              <a:buFont typeface="Arial" panose="020B0604020202020204" pitchFamily="34" charset="0"/>
+              <a:buChar char="•"/>
+              <a:defRPr sz="1800" kern="1200">
+                <a:solidFill>
+                  <a:schemeClr val="tx1"/>
+                </a:solidFill>
+                <a:latin typeface="+mn-lt"/>
+                <a:ea typeface="+mn-ea"/>
+                <a:cs typeface="+mn-cs"/>
+              </a:defRPr>
+            </a:lvl5pPr>
+            <a:lvl6pPr marL="2514600" indent="-228600" algn="l" defTabSz="914400" rtl="0" eaLnBrk="1" latinLnBrk="0" hangingPunct="1">
+              <a:lnSpc>
+                <a:spcPct val="90000"/>
+              </a:lnSpc>
+              <a:spcBef>
+                <a:spcPts val="500"/>
+              </a:spcBef>
+              <a:buFont typeface="Arial" panose="020B0604020202020204" pitchFamily="34" charset="0"/>
+              <a:buChar char="•"/>
+              <a:defRPr sz="1800" kern="1200">
+                <a:solidFill>
+                  <a:schemeClr val="tx1"/>
+                </a:solidFill>
+                <a:latin typeface="+mn-lt"/>
+                <a:ea typeface="+mn-ea"/>
+                <a:cs typeface="+mn-cs"/>
+              </a:defRPr>
+            </a:lvl6pPr>
+            <a:lvl7pPr marL="2971800" indent="-228600" algn="l" defTabSz="914400" rtl="0" eaLnBrk="1" latinLnBrk="0" hangingPunct="1">
+              <a:lnSpc>
+                <a:spcPct val="90000"/>
+              </a:lnSpc>
+              <a:spcBef>
+                <a:spcPts val="500"/>
+              </a:spcBef>
+              <a:buFont typeface="Arial" panose="020B0604020202020204" pitchFamily="34" charset="0"/>
+              <a:buChar char="•"/>
+              <a:defRPr sz="1800" kern="1200">
+                <a:solidFill>
+                  <a:schemeClr val="tx1"/>
+                </a:solidFill>
+                <a:latin typeface="+mn-lt"/>
+                <a:ea typeface="+mn-ea"/>
+                <a:cs typeface="+mn-cs"/>
+              </a:defRPr>
+            </a:lvl7pPr>
+            <a:lvl8pPr marL="3429000" indent="-228600" algn="l" defTabSz="914400" rtl="0" eaLnBrk="1" latinLnBrk="0" hangingPunct="1">
+              <a:lnSpc>
+                <a:spcPct val="90000"/>
+              </a:lnSpc>
+              <a:spcBef>
+                <a:spcPts val="500"/>
+              </a:spcBef>
+              <a:buFont typeface="Arial" panose="020B0604020202020204" pitchFamily="34" charset="0"/>
+              <a:buChar char="•"/>
+              <a:defRPr sz="1800" kern="1200">
+                <a:solidFill>
+                  <a:schemeClr val="tx1"/>
+                </a:solidFill>
+                <a:latin typeface="+mn-lt"/>
+                <a:ea typeface="+mn-ea"/>
+                <a:cs typeface="+mn-cs"/>
+              </a:defRPr>
+            </a:lvl8pPr>
+            <a:lvl9pPr marL="3886200" indent="-228600" algn="l" defTabSz="914400" rtl="0" eaLnBrk="1" latinLnBrk="0" hangingPunct="1">
+              <a:lnSpc>
+                <a:spcPct val="90000"/>
+              </a:lnSpc>
+              <a:spcBef>
+                <a:spcPts val="500"/>
+              </a:spcBef>
+              <a:buFont typeface="Arial" panose="020B0604020202020204" pitchFamily="34" charset="0"/>
+              <a:buChar char="•"/>
+              <a:defRPr sz="1800" kern="1200">
+                <a:solidFill>
+                  <a:schemeClr val="tx1"/>
+                </a:solidFill>
+                <a:latin typeface="+mn-lt"/>
+                <a:ea typeface="+mn-ea"/>
+                <a:cs typeface="+mn-cs"/>
+              </a:defRPr>
+            </a:lvl9pPr>
+          </a:lstStyle>
+          <a:p>
+            <a:pPr marL="0" indent="0" algn="ctr">
               <a:buNone/>
             </a:pPr>
             <a:r>
-              <a:rPr lang="de-DE" sz="1600" dirty="0"/>
-              <a:t>Interface </a:t>
-            </a:r>
-            <a:r>
-              <a:rPr lang="de-DE" sz="1600" dirty="0" err="1"/>
-              <a:t>IScale</a:t>
-            </a:r>
-            <a:endParaRPr lang="de-DE" sz="1600" dirty="0"/>
-          </a:p>
-          <a:p>
-            <a:pPr marL="0" indent="0">
-              <a:buNone/>
-            </a:pPr>
-            <a:r>
-              <a:rPr lang="de-DE" sz="1600" dirty="0"/>
-              <a:t>------------------------------------------</a:t>
-            </a:r>
-          </a:p>
-          <a:p>
-            <a:pPr marL="0" indent="0">
-              <a:buNone/>
-            </a:pPr>
-            <a:r>
-              <a:rPr lang="de-DE" sz="1600" dirty="0" err="1"/>
-              <a:t>public</a:t>
-            </a:r>
-            <a:r>
-              <a:rPr lang="de-DE" sz="1600" dirty="0"/>
-              <a:t> </a:t>
-            </a:r>
-            <a:r>
-              <a:rPr lang="de-DE" sz="1600" dirty="0" err="1"/>
-              <a:t>unsigned</a:t>
-            </a:r>
-            <a:r>
-              <a:rPr lang="de-DE" sz="1600" dirty="0"/>
-              <a:t> </a:t>
-            </a:r>
-            <a:r>
-              <a:rPr lang="de-DE" sz="1600" dirty="0" err="1"/>
-              <a:t>int</a:t>
-            </a:r>
-            <a:r>
-              <a:rPr lang="de-DE" sz="1600" dirty="0"/>
-              <a:t> </a:t>
-            </a:r>
-            <a:r>
-              <a:rPr lang="de-DE" sz="1600" dirty="0" err="1"/>
-              <a:t>GetWeigt</a:t>
-            </a:r>
-            <a:r>
-              <a:rPr lang="de-DE" sz="1600" dirty="0"/>
-              <a:t>()    //Gewicht in Gramm</a:t>
-            </a:r>
-          </a:p>
-          <a:p>
-            <a:pPr marL="0" indent="0">
-              <a:buNone/>
-            </a:pPr>
-            <a:endParaRPr lang="de-DE" sz="1600" dirty="0"/>
-          </a:p>
-          <a:p>
-            <a:pPr marL="0" indent="0">
-              <a:buNone/>
-            </a:pPr>
-            <a:endParaRPr lang="de-DE" sz="1600" dirty="0"/>
-          </a:p>
-          <a:p>
-            <a:pPr marL="0" indent="0">
-              <a:buNone/>
-            </a:pPr>
-            <a:endParaRPr lang="de-DE" sz="1600" dirty="0"/>
-          </a:p>
-          <a:p>
-            <a:pPr marL="0" indent="0">
-              <a:buNone/>
-            </a:pPr>
-            <a:r>
-              <a:rPr lang="de-DE" sz="1600" dirty="0"/>
-              <a:t>Interface </a:t>
-            </a:r>
-            <a:r>
-              <a:rPr lang="de-DE" sz="1600" dirty="0" err="1"/>
-              <a:t>IBarcodescanner</a:t>
-            </a:r>
-            <a:endParaRPr lang="de-DE" sz="1600" dirty="0"/>
-          </a:p>
-          <a:p>
-            <a:pPr marL="0" indent="0">
-              <a:buNone/>
-            </a:pPr>
-            <a:r>
-              <a:rPr lang="de-DE" sz="1600" dirty="0"/>
-              <a:t>------------------------------------------</a:t>
-            </a:r>
-          </a:p>
-          <a:p>
-            <a:pPr marL="0" indent="0">
-              <a:buNone/>
-            </a:pPr>
-            <a:r>
-              <a:rPr lang="de-DE" sz="1600" dirty="0" err="1"/>
-              <a:t>public</a:t>
-            </a:r>
-            <a:r>
-              <a:rPr lang="de-DE" sz="1600" dirty="0"/>
-              <a:t> </a:t>
-            </a:r>
-            <a:r>
-              <a:rPr lang="de-DE" sz="1600" dirty="0" err="1"/>
-              <a:t>delegate</a:t>
-            </a:r>
-            <a:r>
-              <a:rPr lang="de-DE" sz="1600" dirty="0"/>
-              <a:t> </a:t>
-            </a:r>
-            <a:r>
-              <a:rPr lang="de-DE" sz="1600" dirty="0" err="1"/>
-              <a:t>void</a:t>
-            </a:r>
-            <a:r>
-              <a:rPr lang="de-DE" sz="1600" dirty="0"/>
-              <a:t> </a:t>
-            </a:r>
-            <a:r>
-              <a:rPr lang="de-DE" sz="1600" dirty="0" err="1"/>
-              <a:t>BarcodeHandler</a:t>
-            </a:r>
-            <a:r>
-              <a:rPr lang="de-DE" sz="1600" dirty="0"/>
-              <a:t>(</a:t>
-            </a:r>
-            <a:r>
-              <a:rPr lang="de-DE" sz="1600" dirty="0" err="1"/>
-              <a:t>unsigned</a:t>
-            </a:r>
-            <a:r>
-              <a:rPr lang="de-DE" sz="1600" dirty="0"/>
-              <a:t> </a:t>
-            </a:r>
-            <a:r>
-              <a:rPr lang="de-DE" sz="1600" dirty="0" err="1"/>
-              <a:t>long</a:t>
-            </a:r>
-            <a:r>
-              <a:rPr lang="de-DE" sz="1600" dirty="0"/>
-              <a:t>)</a:t>
-            </a:r>
-          </a:p>
-          <a:p>
-            <a:pPr marL="0" indent="0">
-              <a:buNone/>
-            </a:pPr>
-            <a:r>
-              <a:rPr lang="de-DE" sz="1600" dirty="0" err="1"/>
-              <a:t>public</a:t>
-            </a:r>
-            <a:r>
-              <a:rPr lang="de-DE" sz="1600" dirty="0"/>
-              <a:t> </a:t>
-            </a:r>
-            <a:r>
-              <a:rPr lang="de-DE" sz="1600" dirty="0" err="1"/>
-              <a:t>event</a:t>
-            </a:r>
-            <a:r>
-              <a:rPr lang="de-DE" sz="1600" dirty="0"/>
-              <a:t> </a:t>
-            </a:r>
-            <a:r>
-              <a:rPr lang="de-DE" sz="1600" dirty="0" err="1"/>
-              <a:t>BarcodeHandler</a:t>
-            </a:r>
-            <a:r>
-              <a:rPr lang="de-DE" sz="1600" dirty="0"/>
-              <a:t> </a:t>
-            </a:r>
-            <a:r>
-              <a:rPr lang="de-DE" sz="1600" dirty="0" err="1"/>
-              <a:t>ScannedBarcode</a:t>
-            </a:r>
-            <a:endParaRPr lang="de-DE" sz="1600" dirty="0"/>
+              <a:rPr lang="de-DE" sz="3000" u="sng" dirty="0"/>
+              <a:t>Model - View – Controller (Beispiel Content)</a:t>
+            </a:r>
           </a:p>
         </p:txBody>
       </p:sp>
     </p:spTree>
     <p:extLst>
       <p:ext uri="{BB962C8B-B14F-4D97-AF65-F5344CB8AC3E}">
-        <p14:creationId xmlns:p14="http://schemas.microsoft.com/office/powerpoint/2010/main" val="3995426804"/>
+        <p14:creationId xmlns:p14="http://schemas.microsoft.com/office/powerpoint/2010/main" val="3701665842"/>
       </p:ext>
     </p:extLst>
   </p:cSld>

</xml_diff>

<commit_message>
Link zum UML Produkte hinzugefügt Folie zur 3 Schichten Architektur hinzugefügt
</commit_message>
<xml_diff>
--- a/Dokumentation/grobkonzept.pptx
+++ b/Dokumentation/grobkonzept.pptx
@@ -5,10 +5,11 @@
     <p:sldMasterId id="2147483648" r:id="rId1"/>
   </p:sldMasterIdLst>
   <p:notesMasterIdLst>
-    <p:notesMasterId r:id="rId3"/>
+    <p:notesMasterId r:id="rId4"/>
   </p:notesMasterIdLst>
   <p:sldIdLst>
-    <p:sldId id="256" r:id="rId2"/>
+    <p:sldId id="257" r:id="rId2"/>
+    <p:sldId id="256" r:id="rId3"/>
   </p:sldIdLst>
   <p:sldSz cx="12192000" cy="6858000"/>
   <p:notesSz cx="6858000" cy="9144000"/>
@@ -209,7 +210,7 @@
           <a:p>
             <a:fld id="{F1CAF840-27E4-4239-B411-7319B5DE6B82}" type="datetimeFigureOut">
               <a:rPr lang="de-DE" smtClean="0"/>
-              <a:t>04.05.2020</a:t>
+              <a:t>06.05.2020</a:t>
             </a:fld>
             <a:endParaRPr lang="de-DE"/>
           </a:p>
@@ -623,7 +624,7 @@
           <a:p>
             <a:fld id="{723101A8-F6CA-47F5-8A07-6FC06EC7AF15}" type="datetimeFigureOut">
               <a:rPr lang="de-DE" smtClean="0"/>
-              <a:t>04.05.2020</a:t>
+              <a:t>06.05.2020</a:t>
             </a:fld>
             <a:endParaRPr lang="de-DE"/>
           </a:p>
@@ -821,7 +822,7 @@
           <a:p>
             <a:fld id="{723101A8-F6CA-47F5-8A07-6FC06EC7AF15}" type="datetimeFigureOut">
               <a:rPr lang="de-DE" smtClean="0"/>
-              <a:t>04.05.2020</a:t>
+              <a:t>06.05.2020</a:t>
             </a:fld>
             <a:endParaRPr lang="de-DE"/>
           </a:p>
@@ -1029,7 +1030,7 @@
           <a:p>
             <a:fld id="{723101A8-F6CA-47F5-8A07-6FC06EC7AF15}" type="datetimeFigureOut">
               <a:rPr lang="de-DE" smtClean="0"/>
-              <a:t>04.05.2020</a:t>
+              <a:t>06.05.2020</a:t>
             </a:fld>
             <a:endParaRPr lang="de-DE"/>
           </a:p>
@@ -1227,7 +1228,7 @@
           <a:p>
             <a:fld id="{723101A8-F6CA-47F5-8A07-6FC06EC7AF15}" type="datetimeFigureOut">
               <a:rPr lang="de-DE" smtClean="0"/>
-              <a:t>04.05.2020</a:t>
+              <a:t>06.05.2020</a:t>
             </a:fld>
             <a:endParaRPr lang="de-DE"/>
           </a:p>
@@ -1502,7 +1503,7 @@
           <a:p>
             <a:fld id="{723101A8-F6CA-47F5-8A07-6FC06EC7AF15}" type="datetimeFigureOut">
               <a:rPr lang="de-DE" smtClean="0"/>
-              <a:t>04.05.2020</a:t>
+              <a:t>06.05.2020</a:t>
             </a:fld>
             <a:endParaRPr lang="de-DE"/>
           </a:p>
@@ -1767,7 +1768,7 @@
           <a:p>
             <a:fld id="{723101A8-F6CA-47F5-8A07-6FC06EC7AF15}" type="datetimeFigureOut">
               <a:rPr lang="de-DE" smtClean="0"/>
-              <a:t>04.05.2020</a:t>
+              <a:t>06.05.2020</a:t>
             </a:fld>
             <a:endParaRPr lang="de-DE"/>
           </a:p>
@@ -2179,7 +2180,7 @@
           <a:p>
             <a:fld id="{723101A8-F6CA-47F5-8A07-6FC06EC7AF15}" type="datetimeFigureOut">
               <a:rPr lang="de-DE" smtClean="0"/>
-              <a:t>04.05.2020</a:t>
+              <a:t>06.05.2020</a:t>
             </a:fld>
             <a:endParaRPr lang="de-DE"/>
           </a:p>
@@ -2320,7 +2321,7 @@
           <a:p>
             <a:fld id="{723101A8-F6CA-47F5-8A07-6FC06EC7AF15}" type="datetimeFigureOut">
               <a:rPr lang="de-DE" smtClean="0"/>
-              <a:t>04.05.2020</a:t>
+              <a:t>06.05.2020</a:t>
             </a:fld>
             <a:endParaRPr lang="de-DE"/>
           </a:p>
@@ -2433,7 +2434,7 @@
           <a:p>
             <a:fld id="{723101A8-F6CA-47F5-8A07-6FC06EC7AF15}" type="datetimeFigureOut">
               <a:rPr lang="de-DE" smtClean="0"/>
-              <a:t>04.05.2020</a:t>
+              <a:t>06.05.2020</a:t>
             </a:fld>
             <a:endParaRPr lang="de-DE"/>
           </a:p>
@@ -2744,7 +2745,7 @@
           <a:p>
             <a:fld id="{723101A8-F6CA-47F5-8A07-6FC06EC7AF15}" type="datetimeFigureOut">
               <a:rPr lang="de-DE" smtClean="0"/>
-              <a:t>04.05.2020</a:t>
+              <a:t>06.05.2020</a:t>
             </a:fld>
             <a:endParaRPr lang="de-DE"/>
           </a:p>
@@ -3032,7 +3033,7 @@
           <a:p>
             <a:fld id="{723101A8-F6CA-47F5-8A07-6FC06EC7AF15}" type="datetimeFigureOut">
               <a:rPr lang="de-DE" smtClean="0"/>
-              <a:t>04.05.2020</a:t>
+              <a:t>06.05.2020</a:t>
             </a:fld>
             <a:endParaRPr lang="de-DE"/>
           </a:p>
@@ -3273,7 +3274,7 @@
           <a:p>
             <a:fld id="{723101A8-F6CA-47F5-8A07-6FC06EC7AF15}" type="datetimeFigureOut">
               <a:rPr lang="de-DE" smtClean="0"/>
-              <a:t>04.05.2020</a:t>
+              <a:t>06.05.2020</a:t>
             </a:fld>
             <a:endParaRPr lang="de-DE"/>
           </a:p>
@@ -3690,6 +3691,292 @@
           <a:chExt cx="0" cy="0"/>
         </a:xfrm>
       </p:grpSpPr>
+      <p:pic>
+        <p:nvPicPr>
+          <p:cNvPr id="5" name="Inhaltsplatzhalter 4">
+            <a:extLst>
+              <a:ext uri="{FF2B5EF4-FFF2-40B4-BE49-F238E27FC236}">
+                <a16:creationId xmlns:a16="http://schemas.microsoft.com/office/drawing/2014/main" id="{FE89ABDB-E86B-428B-BC02-660B88C78894}"/>
+              </a:ext>
+            </a:extLst>
+          </p:cNvPr>
+          <p:cNvPicPr>
+            <a:picLocks noGrp="1" noChangeAspect="1"/>
+          </p:cNvPicPr>
+          <p:nvPr>
+            <p:ph idx="1"/>
+          </p:nvPr>
+        </p:nvPicPr>
+        <p:blipFill>
+          <a:blip r:embed="rId2">
+            <a:extLst>
+              <a:ext uri="{28A0092B-C50C-407E-A947-70E740481C1C}">
+                <a14:useLocalDpi xmlns:a14="http://schemas.microsoft.com/office/drawing/2010/main" val="0"/>
+              </a:ext>
+            </a:extLst>
+          </a:blip>
+          <a:stretch>
+            <a:fillRect/>
+          </a:stretch>
+        </p:blipFill>
+        <p:spPr>
+          <a:xfrm>
+            <a:off x="1707992" y="1104568"/>
+            <a:ext cx="4671463" cy="3169920"/>
+          </a:xfrm>
+        </p:spPr>
+      </p:pic>
+      <p:sp>
+        <p:nvSpPr>
+          <p:cNvPr id="6" name="Textfeld 5">
+            <a:extLst>
+              <a:ext uri="{FF2B5EF4-FFF2-40B4-BE49-F238E27FC236}">
+                <a16:creationId xmlns:a16="http://schemas.microsoft.com/office/drawing/2014/main" id="{51A9097F-F1A5-4A95-8283-975CBCB7130F}"/>
+              </a:ext>
+            </a:extLst>
+          </p:cNvPr>
+          <p:cNvSpPr txBox="1"/>
+          <p:nvPr/>
+        </p:nvSpPr>
+        <p:spPr>
+          <a:xfrm>
+            <a:off x="6459109" y="1380545"/>
+            <a:ext cx="2827569" cy="369332"/>
+          </a:xfrm>
+          <a:prstGeom prst="rect">
+            <a:avLst/>
+          </a:prstGeom>
+          <a:noFill/>
+        </p:spPr>
+        <p:txBody>
+          <a:bodyPr wrap="none" rtlCol="0">
+            <a:spAutoFit/>
+          </a:bodyPr>
+          <a:lstStyle/>
+          <a:p>
+            <a:r>
+              <a:rPr lang="de-DE" dirty="0"/>
+              <a:t>.NET Forms / </a:t>
+            </a:r>
+            <a:r>
+              <a:rPr lang="de-DE" dirty="0" err="1"/>
+              <a:t>AndroidApp</a:t>
+            </a:r>
+            <a:r>
+              <a:rPr lang="de-DE" dirty="0"/>
+              <a:t> UI</a:t>
+            </a:r>
+          </a:p>
+        </p:txBody>
+      </p:sp>
+      <p:sp>
+        <p:nvSpPr>
+          <p:cNvPr id="7" name="Textfeld 6">
+            <a:extLst>
+              <a:ext uri="{FF2B5EF4-FFF2-40B4-BE49-F238E27FC236}">
+                <a16:creationId xmlns:a16="http://schemas.microsoft.com/office/drawing/2014/main" id="{063AA19A-B277-4555-9489-406556180421}"/>
+              </a:ext>
+            </a:extLst>
+          </p:cNvPr>
+          <p:cNvSpPr txBox="1"/>
+          <p:nvPr/>
+        </p:nvSpPr>
+        <p:spPr>
+          <a:xfrm>
+            <a:off x="6459109" y="2544619"/>
+            <a:ext cx="3390480" cy="369332"/>
+          </a:xfrm>
+          <a:prstGeom prst="rect">
+            <a:avLst/>
+          </a:prstGeom>
+          <a:noFill/>
+        </p:spPr>
+        <p:txBody>
+          <a:bodyPr wrap="none" rtlCol="0">
+            <a:spAutoFit/>
+          </a:bodyPr>
+          <a:lstStyle/>
+          <a:p>
+            <a:r>
+              <a:rPr lang="de-DE" dirty="0"/>
+              <a:t>Logik, Verarbeitung der Anfragen</a:t>
+            </a:r>
+          </a:p>
+        </p:txBody>
+      </p:sp>
+      <p:sp>
+        <p:nvSpPr>
+          <p:cNvPr id="8" name="Textfeld 7">
+            <a:extLst>
+              <a:ext uri="{FF2B5EF4-FFF2-40B4-BE49-F238E27FC236}">
+                <a16:creationId xmlns:a16="http://schemas.microsoft.com/office/drawing/2014/main" id="{3FFC1DE7-2064-4403-BB79-73AFF223A314}"/>
+              </a:ext>
+            </a:extLst>
+          </p:cNvPr>
+          <p:cNvSpPr txBox="1"/>
+          <p:nvPr/>
+        </p:nvSpPr>
+        <p:spPr>
+          <a:xfrm>
+            <a:off x="6459109" y="3516408"/>
+            <a:ext cx="3091424" cy="646331"/>
+          </a:xfrm>
+          <a:prstGeom prst="rect">
+            <a:avLst/>
+          </a:prstGeom>
+          <a:noFill/>
+        </p:spPr>
+        <p:txBody>
+          <a:bodyPr wrap="none" rtlCol="0">
+            <a:spAutoFit/>
+          </a:bodyPr>
+          <a:lstStyle/>
+          <a:p>
+            <a:r>
+              <a:rPr lang="de-DE" dirty="0"/>
+              <a:t>Lokale / Öffentliche Datenbank</a:t>
+            </a:r>
+          </a:p>
+          <a:p>
+            <a:r>
+              <a:rPr lang="de-DE" dirty="0"/>
+              <a:t>sowie Zugriffsklassen</a:t>
+            </a:r>
+          </a:p>
+        </p:txBody>
+      </p:sp>
+      <p:sp>
+        <p:nvSpPr>
+          <p:cNvPr id="11" name="Textfeld 10">
+            <a:extLst>
+              <a:ext uri="{FF2B5EF4-FFF2-40B4-BE49-F238E27FC236}">
+                <a16:creationId xmlns:a16="http://schemas.microsoft.com/office/drawing/2014/main" id="{5E0094B2-063B-4F54-94C6-449D5D641097}"/>
+              </a:ext>
+            </a:extLst>
+          </p:cNvPr>
+          <p:cNvSpPr txBox="1"/>
+          <p:nvPr/>
+        </p:nvSpPr>
+        <p:spPr>
+          <a:xfrm>
+            <a:off x="1808028" y="5069230"/>
+            <a:ext cx="4159472" cy="800219"/>
+          </a:xfrm>
+          <a:prstGeom prst="rect">
+            <a:avLst/>
+          </a:prstGeom>
+          <a:noFill/>
+        </p:spPr>
+        <p:txBody>
+          <a:bodyPr wrap="none" rtlCol="0">
+            <a:spAutoFit/>
+          </a:bodyPr>
+          <a:lstStyle/>
+          <a:p>
+            <a:r>
+              <a:rPr lang="de-DE" dirty="0"/>
+              <a:t>Abhängigkeiten </a:t>
+            </a:r>
+            <a:r>
+              <a:rPr lang="de-DE" dirty="0">
+                <a:solidFill>
+                  <a:srgbClr val="FF0000"/>
+                </a:solidFill>
+              </a:rPr>
+              <a:t>NUR</a:t>
+            </a:r>
+            <a:r>
+              <a:rPr lang="de-DE" dirty="0"/>
+              <a:t> von oben nach unten</a:t>
+            </a:r>
+          </a:p>
+          <a:p>
+            <a:r>
+              <a:rPr lang="de-DE" sz="1400" dirty="0"/>
+              <a:t>(Präsentation enthält Referenz auf Logik, Logik hat </a:t>
+            </a:r>
+          </a:p>
+          <a:p>
+            <a:r>
+              <a:rPr lang="de-DE" sz="1400" dirty="0"/>
+              <a:t>Referenz auf Datenbank, aber nicht anders herum)</a:t>
+            </a:r>
+          </a:p>
+        </p:txBody>
+      </p:sp>
+      <p:sp>
+        <p:nvSpPr>
+          <p:cNvPr id="13" name="Textfeld 12">
+            <a:extLst>
+              <a:ext uri="{FF2B5EF4-FFF2-40B4-BE49-F238E27FC236}">
+                <a16:creationId xmlns:a16="http://schemas.microsoft.com/office/drawing/2014/main" id="{2CB4829B-7E31-4533-9193-6A431249919E}"/>
+              </a:ext>
+            </a:extLst>
+          </p:cNvPr>
+          <p:cNvSpPr txBox="1"/>
+          <p:nvPr/>
+        </p:nvSpPr>
+        <p:spPr>
+          <a:xfrm>
+            <a:off x="6610184" y="2350604"/>
+            <a:ext cx="2827569" cy="369332"/>
+          </a:xfrm>
+          <a:prstGeom prst="rect">
+            <a:avLst/>
+          </a:prstGeom>
+          <a:noFill/>
+        </p:spPr>
+        <p:txBody>
+          <a:bodyPr wrap="none" rtlCol="0">
+            <a:spAutoFit/>
+          </a:bodyPr>
+          <a:lstStyle/>
+          <a:p>
+            <a:r>
+              <a:rPr lang="de-DE" dirty="0"/>
+              <a:t>.NET Forms / </a:t>
+            </a:r>
+            <a:r>
+              <a:rPr lang="de-DE" dirty="0" err="1"/>
+              <a:t>AndroidApp</a:t>
+            </a:r>
+            <a:r>
+              <a:rPr lang="de-DE" dirty="0"/>
+              <a:t> UI</a:t>
+            </a:r>
+          </a:p>
+        </p:txBody>
+      </p:sp>
+    </p:spTree>
+    <p:extLst>
+      <p:ext uri="{BB962C8B-B14F-4D97-AF65-F5344CB8AC3E}">
+        <p14:creationId xmlns:p14="http://schemas.microsoft.com/office/powerpoint/2010/main" val="722555861"/>
+      </p:ext>
+    </p:extLst>
+  </p:cSld>
+  <p:clrMapOvr>
+    <a:masterClrMapping/>
+  </p:clrMapOvr>
+</p:sld>
+</file>
+
+<file path=ppt/slides/slide2.xml><?xml version="1.0" encoding="utf-8"?>
+<p:sld xmlns:a="http://schemas.openxmlformats.org/drawingml/2006/main" xmlns:r="http://schemas.openxmlformats.org/officeDocument/2006/relationships" xmlns:p="http://schemas.openxmlformats.org/presentationml/2006/main">
+  <p:cSld>
+    <p:spTree>
+      <p:nvGrpSpPr>
+        <p:cNvPr id="1" name=""/>
+        <p:cNvGrpSpPr/>
+        <p:nvPr/>
+      </p:nvGrpSpPr>
+      <p:grpSpPr>
+        <a:xfrm>
+          <a:off x="0" y="0"/>
+          <a:ext cx="0" cy="0"/>
+          <a:chOff x="0" y="0"/>
+          <a:chExt cx="0" cy="0"/>
+        </a:xfrm>
+      </p:grpSpPr>
       <p:sp>
         <p:nvSpPr>
           <p:cNvPr id="3" name="Untertitel 2">
@@ -3720,7 +4007,7 @@
           <a:p>
             <a:r>
               <a:rPr lang="de-DE" sz="3000" u="sng" dirty="0"/>
-              <a:t>Grobkonzept</a:t>
+              <a:t>Modulplan</a:t>
             </a:r>
           </a:p>
         </p:txBody>
@@ -3975,160 +4262,6 @@
               <a:t>scanner</a:t>
             </a:r>
             <a:endParaRPr lang="de-DE" dirty="0"/>
-          </a:p>
-        </p:txBody>
-      </p:sp>
-      <p:sp>
-        <p:nvSpPr>
-          <p:cNvPr id="16" name="Textfeld 15">
-            <a:extLst>
-              <a:ext uri="{FF2B5EF4-FFF2-40B4-BE49-F238E27FC236}">
-                <a16:creationId xmlns:a16="http://schemas.microsoft.com/office/drawing/2014/main" id="{A83E0C14-8080-4630-8EA5-70332E412A65}"/>
-              </a:ext>
-            </a:extLst>
-          </p:cNvPr>
-          <p:cNvSpPr txBox="1"/>
-          <p:nvPr/>
-        </p:nvSpPr>
-        <p:spPr>
-          <a:xfrm>
-            <a:off x="5330002" y="1546596"/>
-            <a:ext cx="1878337" cy="646331"/>
-          </a:xfrm>
-          <a:prstGeom prst="rect">
-            <a:avLst/>
-          </a:prstGeom>
-          <a:noFill/>
-          <a:ln>
-            <a:solidFill>
-              <a:schemeClr val="bg1">
-                <a:lumMod val="50000"/>
-              </a:schemeClr>
-            </a:solidFill>
-          </a:ln>
-        </p:spPr>
-        <p:txBody>
-          <a:bodyPr wrap="square" rtlCol="0">
-            <a:spAutoFit/>
-          </a:bodyPr>
-          <a:lstStyle/>
-          <a:p>
-            <a:pPr algn="ctr"/>
-            <a:r>
-              <a:rPr lang="de-DE" dirty="0"/>
-              <a:t>Oberfläche</a:t>
-            </a:r>
-          </a:p>
-          <a:p>
-            <a:pPr algn="ctr"/>
-            <a:r>
-              <a:rPr lang="de-DE" dirty="0"/>
-              <a:t>.NET</a:t>
-            </a:r>
-            <a:r>
-              <a:rPr lang="de-DE" dirty="0">
-                <a:solidFill>
-                  <a:schemeClr val="bg1">
-                    <a:lumMod val="50000"/>
-                  </a:schemeClr>
-                </a:solidFill>
-              </a:rPr>
-              <a:t> / Android</a:t>
-            </a:r>
-            <a:endParaRPr lang="de-DE" dirty="0"/>
-          </a:p>
-        </p:txBody>
-      </p:sp>
-      <p:cxnSp>
-        <p:nvCxnSpPr>
-          <p:cNvPr id="20" name="Gerade Verbindung mit Pfeil 19">
-            <a:extLst>
-              <a:ext uri="{FF2B5EF4-FFF2-40B4-BE49-F238E27FC236}">
-                <a16:creationId xmlns:a16="http://schemas.microsoft.com/office/drawing/2014/main" id="{027E9BDD-63FE-4303-BFB0-E72B24737C35}"/>
-              </a:ext>
-            </a:extLst>
-          </p:cNvPr>
-          <p:cNvCxnSpPr>
-            <a:cxnSpLocks/>
-            <a:endCxn id="5" idx="0"/>
-          </p:cNvCxnSpPr>
-          <p:nvPr/>
-        </p:nvCxnSpPr>
-        <p:spPr>
-          <a:xfrm flipH="1">
-            <a:off x="3734970" y="2198781"/>
-            <a:ext cx="2361030" cy="1008922"/>
-          </a:xfrm>
-          <a:prstGeom prst="straightConnector1">
-            <a:avLst/>
-          </a:prstGeom>
-          <a:ln>
-            <a:solidFill>
-              <a:schemeClr val="bg1">
-                <a:lumMod val="65000"/>
-              </a:schemeClr>
-            </a:solidFill>
-            <a:tailEnd type="triangle"/>
-          </a:ln>
-        </p:spPr>
-        <p:style>
-          <a:lnRef idx="1">
-            <a:schemeClr val="accent1"/>
-          </a:lnRef>
-          <a:fillRef idx="0">
-            <a:schemeClr val="accent1"/>
-          </a:fillRef>
-          <a:effectRef idx="0">
-            <a:schemeClr val="accent1"/>
-          </a:effectRef>
-          <a:fontRef idx="minor">
-            <a:schemeClr val="tx1"/>
-          </a:fontRef>
-        </p:style>
-      </p:cxnSp>
-      <p:sp>
-        <p:nvSpPr>
-          <p:cNvPr id="23" name="Textfeld 22">
-            <a:extLst>
-              <a:ext uri="{FF2B5EF4-FFF2-40B4-BE49-F238E27FC236}">
-                <a16:creationId xmlns:a16="http://schemas.microsoft.com/office/drawing/2014/main" id="{F29CAA68-66F5-4715-A9BD-F0250DDDFF6F}"/>
-              </a:ext>
-            </a:extLst>
-          </p:cNvPr>
-          <p:cNvSpPr txBox="1"/>
-          <p:nvPr/>
-        </p:nvSpPr>
-        <p:spPr>
-          <a:xfrm>
-            <a:off x="4721941" y="2495666"/>
-            <a:ext cx="734304" cy="276999"/>
-          </a:xfrm>
-          <a:prstGeom prst="rect">
-            <a:avLst/>
-          </a:prstGeom>
-          <a:solidFill>
-            <a:schemeClr val="bg1"/>
-          </a:solidFill>
-          <a:ln>
-            <a:noFill/>
-          </a:ln>
-        </p:spPr>
-        <p:txBody>
-          <a:bodyPr wrap="none" rtlCol="0">
-            <a:spAutoFit/>
-          </a:bodyPr>
-          <a:lstStyle/>
-          <a:p>
-            <a:r>
-              <a:rPr lang="de-DE" sz="1200" dirty="0">
-                <a:solidFill>
-                  <a:schemeClr val="bg1">
-                    <a:lumMod val="50000"/>
-                  </a:schemeClr>
-                </a:solidFill>
-              </a:rPr>
-              <a:t>stellt dar</a:t>
-            </a:r>
           </a:p>
         </p:txBody>
       </p:sp>
@@ -4274,159 +4407,6 @@
           </a:p>
         </p:txBody>
       </p:sp>
-      <p:cxnSp>
-        <p:nvCxnSpPr>
-          <p:cNvPr id="41" name="Gerade Verbindung mit Pfeil 40">
-            <a:extLst>
-              <a:ext uri="{FF2B5EF4-FFF2-40B4-BE49-F238E27FC236}">
-                <a16:creationId xmlns:a16="http://schemas.microsoft.com/office/drawing/2014/main" id="{A22A5B2C-C3FB-4113-8AAD-7677300D468F}"/>
-              </a:ext>
-            </a:extLst>
-          </p:cNvPr>
-          <p:cNvCxnSpPr>
-            <a:cxnSpLocks/>
-            <a:endCxn id="6" idx="0"/>
-          </p:cNvCxnSpPr>
-          <p:nvPr/>
-        </p:nvCxnSpPr>
-        <p:spPr>
-          <a:xfrm>
-            <a:off x="6406290" y="2198781"/>
-            <a:ext cx="1325959" cy="1008922"/>
-          </a:xfrm>
-          <a:prstGeom prst="straightConnector1">
-            <a:avLst/>
-          </a:prstGeom>
-          <a:ln>
-            <a:solidFill>
-              <a:schemeClr val="bg1">
-                <a:lumMod val="65000"/>
-              </a:schemeClr>
-            </a:solidFill>
-            <a:tailEnd type="triangle"/>
-          </a:ln>
-        </p:spPr>
-        <p:style>
-          <a:lnRef idx="1">
-            <a:schemeClr val="accent1"/>
-          </a:lnRef>
-          <a:fillRef idx="0">
-            <a:schemeClr val="accent1"/>
-          </a:fillRef>
-          <a:effectRef idx="0">
-            <a:schemeClr val="accent1"/>
-          </a:effectRef>
-          <a:fontRef idx="minor">
-            <a:schemeClr val="tx1"/>
-          </a:fontRef>
-        </p:style>
-      </p:cxnSp>
-      <p:sp>
-        <p:nvSpPr>
-          <p:cNvPr id="44" name="Textfeld 43">
-            <a:extLst>
-              <a:ext uri="{FF2B5EF4-FFF2-40B4-BE49-F238E27FC236}">
-                <a16:creationId xmlns:a16="http://schemas.microsoft.com/office/drawing/2014/main" id="{390672C3-8BBC-4F14-8843-F164249BB3FA}"/>
-              </a:ext>
-            </a:extLst>
-          </p:cNvPr>
-          <p:cNvSpPr txBox="1"/>
-          <p:nvPr/>
-        </p:nvSpPr>
-        <p:spPr>
-          <a:xfrm>
-            <a:off x="6724073" y="2468358"/>
-            <a:ext cx="873765" cy="461665"/>
-          </a:xfrm>
-          <a:prstGeom prst="rect">
-            <a:avLst/>
-          </a:prstGeom>
-          <a:solidFill>
-            <a:schemeClr val="bg1"/>
-          </a:solidFill>
-          <a:ln>
-            <a:noFill/>
-          </a:ln>
-        </p:spPr>
-        <p:txBody>
-          <a:bodyPr wrap="none" rtlCol="0">
-            <a:spAutoFit/>
-          </a:bodyPr>
-          <a:lstStyle/>
-          <a:p>
-            <a:r>
-              <a:rPr lang="de-DE" sz="1200" dirty="0">
-                <a:solidFill>
-                  <a:schemeClr val="bg1">
-                    <a:lumMod val="50000"/>
-                  </a:schemeClr>
-                </a:solidFill>
-              </a:rPr>
-              <a:t>stellt dar &amp;</a:t>
-            </a:r>
-          </a:p>
-          <a:p>
-            <a:r>
-              <a:rPr lang="de-DE" sz="1200" dirty="0">
-                <a:solidFill>
-                  <a:schemeClr val="bg1">
-                    <a:lumMod val="50000"/>
-                  </a:schemeClr>
-                </a:solidFill>
-              </a:rPr>
-              <a:t>bearbeitet</a:t>
-            </a:r>
-          </a:p>
-        </p:txBody>
-      </p:sp>
-      <p:cxnSp>
-        <p:nvCxnSpPr>
-          <p:cNvPr id="46" name="Gerade Verbindung mit Pfeil 45">
-            <a:extLst>
-              <a:ext uri="{FF2B5EF4-FFF2-40B4-BE49-F238E27FC236}">
-                <a16:creationId xmlns:a16="http://schemas.microsoft.com/office/drawing/2014/main" id="{7C35EB84-E2BD-4D27-8C0A-A17D230BE288}"/>
-              </a:ext>
-            </a:extLst>
-          </p:cNvPr>
-          <p:cNvCxnSpPr>
-            <a:cxnSpLocks/>
-            <a:stCxn id="16" idx="2"/>
-            <a:endCxn id="31" idx="0"/>
-          </p:cNvCxnSpPr>
-          <p:nvPr/>
-        </p:nvCxnSpPr>
-        <p:spPr>
-          <a:xfrm>
-            <a:off x="6269171" y="2192927"/>
-            <a:ext cx="339309" cy="2047131"/>
-          </a:xfrm>
-          <a:prstGeom prst="straightConnector1">
-            <a:avLst/>
-          </a:prstGeom>
-          <a:ln>
-            <a:solidFill>
-              <a:schemeClr val="bg1">
-                <a:lumMod val="65000"/>
-              </a:schemeClr>
-            </a:solidFill>
-            <a:tailEnd type="triangle"/>
-          </a:ln>
-        </p:spPr>
-        <p:style>
-          <a:lnRef idx="1">
-            <a:schemeClr val="accent1"/>
-          </a:lnRef>
-          <a:fillRef idx="0">
-            <a:schemeClr val="accent1"/>
-          </a:fillRef>
-          <a:effectRef idx="0">
-            <a:schemeClr val="accent1"/>
-          </a:effectRef>
-          <a:fontRef idx="minor">
-            <a:schemeClr val="tx1"/>
-          </a:fontRef>
-        </p:style>
-      </p:cxnSp>
       <p:cxnSp>
         <p:nvCxnSpPr>
           <p:cNvPr id="53" name="Gerade Verbindung mit Pfeil 52">
@@ -4729,157 +4709,6 @@
       </p:sp>
       <p:cxnSp>
         <p:nvCxnSpPr>
-          <p:cNvPr id="84" name="Gerade Verbindung mit Pfeil 83">
-            <a:extLst>
-              <a:ext uri="{FF2B5EF4-FFF2-40B4-BE49-F238E27FC236}">
-                <a16:creationId xmlns:a16="http://schemas.microsoft.com/office/drawing/2014/main" id="{C63BE6CF-EEA4-432A-B251-8665B3BDF41A}"/>
-              </a:ext>
-            </a:extLst>
-          </p:cNvPr>
-          <p:cNvCxnSpPr>
-            <a:cxnSpLocks/>
-            <a:endCxn id="77" idx="0"/>
-          </p:cNvCxnSpPr>
-          <p:nvPr/>
-        </p:nvCxnSpPr>
-        <p:spPr>
-          <a:xfrm>
-            <a:off x="6599501" y="2184138"/>
-            <a:ext cx="3895186" cy="1023565"/>
-          </a:xfrm>
-          <a:prstGeom prst="straightConnector1">
-            <a:avLst/>
-          </a:prstGeom>
-          <a:ln>
-            <a:solidFill>
-              <a:schemeClr val="bg1">
-                <a:lumMod val="65000"/>
-              </a:schemeClr>
-            </a:solidFill>
-            <a:tailEnd type="triangle"/>
-          </a:ln>
-        </p:spPr>
-        <p:style>
-          <a:lnRef idx="1">
-            <a:schemeClr val="accent1"/>
-          </a:lnRef>
-          <a:fillRef idx="0">
-            <a:schemeClr val="accent1"/>
-          </a:fillRef>
-          <a:effectRef idx="0">
-            <a:schemeClr val="accent1"/>
-          </a:effectRef>
-          <a:fontRef idx="minor">
-            <a:schemeClr val="tx1"/>
-          </a:fontRef>
-        </p:style>
-      </p:cxnSp>
-      <p:sp>
-        <p:nvSpPr>
-          <p:cNvPr id="87" name="Textfeld 86">
-            <a:extLst>
-              <a:ext uri="{FF2B5EF4-FFF2-40B4-BE49-F238E27FC236}">
-                <a16:creationId xmlns:a16="http://schemas.microsoft.com/office/drawing/2014/main" id="{9E1DF576-A86A-4F4D-B8CC-67A0D5F44D05}"/>
-              </a:ext>
-            </a:extLst>
-          </p:cNvPr>
-          <p:cNvSpPr txBox="1"/>
-          <p:nvPr/>
-        </p:nvSpPr>
-        <p:spPr>
-          <a:xfrm>
-            <a:off x="8331168" y="2596265"/>
-            <a:ext cx="734304" cy="276999"/>
-          </a:xfrm>
-          <a:prstGeom prst="rect">
-            <a:avLst/>
-          </a:prstGeom>
-          <a:solidFill>
-            <a:schemeClr val="bg1"/>
-          </a:solidFill>
-          <a:ln>
-            <a:noFill/>
-          </a:ln>
-        </p:spPr>
-        <p:txBody>
-          <a:bodyPr wrap="none" rtlCol="0">
-            <a:spAutoFit/>
-          </a:bodyPr>
-          <a:lstStyle/>
-          <a:p>
-            <a:r>
-              <a:rPr lang="de-DE" sz="1200" dirty="0">
-                <a:solidFill>
-                  <a:schemeClr val="bg1">
-                    <a:lumMod val="50000"/>
-                  </a:schemeClr>
-                </a:solidFill>
-              </a:rPr>
-              <a:t>stellt dar</a:t>
-            </a:r>
-          </a:p>
-        </p:txBody>
-      </p:sp>
-      <p:sp>
-        <p:nvSpPr>
-          <p:cNvPr id="89" name="Textfeld 88">
-            <a:extLst>
-              <a:ext uri="{FF2B5EF4-FFF2-40B4-BE49-F238E27FC236}">
-                <a16:creationId xmlns:a16="http://schemas.microsoft.com/office/drawing/2014/main" id="{71E027AD-220B-495C-9D1E-CE21BE4420E2}"/>
-              </a:ext>
-            </a:extLst>
-          </p:cNvPr>
-          <p:cNvSpPr txBox="1"/>
-          <p:nvPr/>
-        </p:nvSpPr>
-        <p:spPr>
-          <a:xfrm>
-            <a:off x="6117689" y="3589591"/>
-            <a:ext cx="873765" cy="461665"/>
-          </a:xfrm>
-          <a:prstGeom prst="rect">
-            <a:avLst/>
-          </a:prstGeom>
-          <a:solidFill>
-            <a:schemeClr val="bg1"/>
-          </a:solidFill>
-          <a:ln>
-            <a:noFill/>
-          </a:ln>
-        </p:spPr>
-        <p:txBody>
-          <a:bodyPr wrap="none" rtlCol="0">
-            <a:spAutoFit/>
-          </a:bodyPr>
-          <a:lstStyle/>
-          <a:p>
-            <a:r>
-              <a:rPr lang="de-DE" sz="1200" dirty="0">
-                <a:solidFill>
-                  <a:schemeClr val="bg1">
-                    <a:lumMod val="50000"/>
-                  </a:schemeClr>
-                </a:solidFill>
-              </a:rPr>
-              <a:t>stellt dar &amp;</a:t>
-            </a:r>
-          </a:p>
-          <a:p>
-            <a:r>
-              <a:rPr lang="de-DE" sz="1200" dirty="0">
-                <a:solidFill>
-                  <a:schemeClr val="bg1">
-                    <a:lumMod val="50000"/>
-                  </a:schemeClr>
-                </a:solidFill>
-              </a:rPr>
-              <a:t>bearbeitet</a:t>
-            </a:r>
-          </a:p>
-        </p:txBody>
-      </p:sp>
-      <p:cxnSp>
-        <p:nvCxnSpPr>
           <p:cNvPr id="28" name="Gerade Verbindung mit Pfeil 27">
             <a:extLst>
               <a:ext uri="{FF2B5EF4-FFF2-40B4-BE49-F238E27FC236}">
@@ -5083,111 +4912,6 @@
           </a:p>
         </p:txBody>
       </p:sp>
-      <p:cxnSp>
-        <p:nvCxnSpPr>
-          <p:cNvPr id="36" name="Gerade Verbindung mit Pfeil 35">
-            <a:extLst>
-              <a:ext uri="{FF2B5EF4-FFF2-40B4-BE49-F238E27FC236}">
-                <a16:creationId xmlns:a16="http://schemas.microsoft.com/office/drawing/2014/main" id="{7ED3E2C5-4682-45EF-8581-BC2F5DDF32C4}"/>
-              </a:ext>
-            </a:extLst>
-          </p:cNvPr>
-          <p:cNvCxnSpPr>
-            <a:cxnSpLocks/>
-            <a:endCxn id="30" idx="0"/>
-          </p:cNvCxnSpPr>
-          <p:nvPr/>
-        </p:nvCxnSpPr>
-        <p:spPr>
-          <a:xfrm flipH="1">
-            <a:off x="1456920" y="2061527"/>
-            <a:ext cx="3848121" cy="1140322"/>
-          </a:xfrm>
-          <a:prstGeom prst="straightConnector1">
-            <a:avLst/>
-          </a:prstGeom>
-          <a:ln>
-            <a:solidFill>
-              <a:schemeClr val="bg1">
-                <a:lumMod val="65000"/>
-              </a:schemeClr>
-            </a:solidFill>
-            <a:tailEnd type="triangle"/>
-          </a:ln>
-        </p:spPr>
-        <p:style>
-          <a:lnRef idx="1">
-            <a:schemeClr val="accent1"/>
-          </a:lnRef>
-          <a:fillRef idx="0">
-            <a:schemeClr val="accent1"/>
-          </a:fillRef>
-          <a:effectRef idx="0">
-            <a:schemeClr val="accent1"/>
-          </a:effectRef>
-          <a:fontRef idx="minor">
-            <a:schemeClr val="tx1"/>
-          </a:fontRef>
-        </p:style>
-      </p:cxnSp>
-      <p:sp>
-        <p:nvSpPr>
-          <p:cNvPr id="38" name="Textfeld 37">
-            <a:extLst>
-              <a:ext uri="{FF2B5EF4-FFF2-40B4-BE49-F238E27FC236}">
-                <a16:creationId xmlns:a16="http://schemas.microsoft.com/office/drawing/2014/main" id="{2FD9ECAE-DC89-424F-B8F7-DBA476B8427C}"/>
-              </a:ext>
-            </a:extLst>
-          </p:cNvPr>
-          <p:cNvSpPr txBox="1"/>
-          <p:nvPr/>
-        </p:nvSpPr>
-        <p:spPr>
-          <a:xfrm>
-            <a:off x="3224787" y="2273452"/>
-            <a:ext cx="873765" cy="461665"/>
-          </a:xfrm>
-          <a:prstGeom prst="rect">
-            <a:avLst/>
-          </a:prstGeom>
-          <a:solidFill>
-            <a:schemeClr val="bg1"/>
-          </a:solidFill>
-          <a:ln>
-            <a:noFill/>
-          </a:ln>
-        </p:spPr>
-        <p:txBody>
-          <a:bodyPr wrap="none" rtlCol="0">
-            <a:spAutoFit/>
-          </a:bodyPr>
-          <a:lstStyle/>
-          <a:p>
-            <a:r>
-              <a:rPr lang="de-DE" sz="1200" dirty="0">
-                <a:solidFill>
-                  <a:schemeClr val="bg1">
-                    <a:lumMod val="50000"/>
-                  </a:schemeClr>
-                </a:solidFill>
-              </a:rPr>
-              <a:t>stellt dar &amp;</a:t>
-            </a:r>
-          </a:p>
-          <a:p>
-            <a:r>
-              <a:rPr lang="de-DE" sz="1200" dirty="0">
-                <a:solidFill>
-                  <a:schemeClr val="bg1">
-                    <a:lumMod val="50000"/>
-                  </a:schemeClr>
-                </a:solidFill>
-              </a:rPr>
-              <a:t>bearbeitet</a:t>
-            </a:r>
-          </a:p>
-        </p:txBody>
-      </p:sp>
     </p:spTree>
     <p:extLst>
       <p:ext uri="{BB962C8B-B14F-4D97-AF65-F5344CB8AC3E}">
@@ -5210,6 +4934,9 @@
                     <p:cTn id="3" fill="hold">
                       <p:stCondLst>
                         <p:cond delay="indefinite"/>
+                        <p:cond evt="onBegin" delay="0">
+                          <p:tn val="2"/>
+                        </p:cond>
                       </p:stCondLst>
                       <p:childTnLst>
                         <p:par>
@@ -5219,7 +4946,7 @@
                             </p:stCondLst>
                             <p:childTnLst>
                               <p:par>
-                                <p:cTn id="5" presetID="1" presetClass="entr" presetSubtype="0" fill="hold" nodeType="clickEffect">
+                                <p:cTn id="5" presetID="1" presetClass="entr" presetSubtype="0" fill="hold" grpId="0" nodeType="withEffect">
                                   <p:stCondLst>
                                     <p:cond delay="0"/>
                                   </p:stCondLst>
@@ -5232,7 +4959,7 @@
                                           </p:stCondLst>
                                         </p:cTn>
                                         <p:tgtEl>
-                                          <p:spTgt spid="20"/>
+                                          <p:spTgt spid="71"/>
                                         </p:tgtEl>
                                         <p:attrNameLst>
                                           <p:attrName>style.visibility</p:attrName>
@@ -5246,7 +4973,7 @@
                                 </p:cTn>
                               </p:par>
                               <p:par>
-                                <p:cTn id="7" presetID="1" presetClass="entr" presetSubtype="0" fill="hold" grpId="0" nodeType="withEffect">
+                                <p:cTn id="7" presetID="1" presetClass="entr" presetSubtype="0" fill="hold" nodeType="withEffect">
                                   <p:stCondLst>
                                     <p:cond delay="0"/>
                                   </p:stCondLst>
@@ -5259,7 +4986,7 @@
                                           </p:stCondLst>
                                         </p:cTn>
                                         <p:tgtEl>
-                                          <p:spTgt spid="23"/>
+                                          <p:spTgt spid="66"/>
                                         </p:tgtEl>
                                         <p:attrNameLst>
                                           <p:attrName>style.visibility</p:attrName>
@@ -5286,7 +5013,7 @@
                                           </p:stCondLst>
                                         </p:cTn>
                                         <p:tgtEl>
-                                          <p:spTgt spid="16"/>
+                                          <p:spTgt spid="35"/>
                                         </p:tgtEl>
                                         <p:attrNameLst>
                                           <p:attrName>style.visibility</p:attrName>
@@ -5313,7 +5040,7 @@
                                           </p:stCondLst>
                                         </p:cTn>
                                         <p:tgtEl>
-                                          <p:spTgt spid="46"/>
+                                          <p:spTgt spid="32"/>
                                         </p:tgtEl>
                                         <p:attrNameLst>
                                           <p:attrName>style.visibility</p:attrName>
@@ -5340,322 +5067,7 @@
                                           </p:stCondLst>
                                         </p:cTn>
                                         <p:tgtEl>
-                                          <p:spTgt spid="44"/>
-                                        </p:tgtEl>
-                                        <p:attrNameLst>
-                                          <p:attrName>style.visibility</p:attrName>
-                                        </p:attrNameLst>
-                                      </p:cBhvr>
-                                      <p:to>
-                                        <p:strVal val="visible"/>
-                                      </p:to>
-                                    </p:set>
-                                  </p:childTnLst>
-                                </p:cTn>
-                              </p:par>
-                              <p:par>
-                                <p:cTn id="15" presetID="1" presetClass="entr" presetSubtype="0" fill="hold" nodeType="withEffect">
-                                  <p:stCondLst>
-                                    <p:cond delay="0"/>
-                                  </p:stCondLst>
-                                  <p:childTnLst>
-                                    <p:set>
-                                      <p:cBhvr>
-                                        <p:cTn id="16" dur="1" fill="hold">
-                                          <p:stCondLst>
-                                            <p:cond delay="0"/>
-                                          </p:stCondLst>
-                                        </p:cTn>
-                                        <p:tgtEl>
-                                          <p:spTgt spid="41"/>
-                                        </p:tgtEl>
-                                        <p:attrNameLst>
-                                          <p:attrName>style.visibility</p:attrName>
-                                        </p:attrNameLst>
-                                      </p:cBhvr>
-                                      <p:to>
-                                        <p:strVal val="visible"/>
-                                      </p:to>
-                                    </p:set>
-                                  </p:childTnLst>
-                                </p:cTn>
-                              </p:par>
-                              <p:par>
-                                <p:cTn id="17" presetID="1" presetClass="entr" presetSubtype="0" fill="hold" nodeType="withEffect">
-                                  <p:stCondLst>
-                                    <p:cond delay="0"/>
-                                  </p:stCondLst>
-                                  <p:childTnLst>
-                                    <p:set>
-                                      <p:cBhvr>
-                                        <p:cTn id="18" dur="1" fill="hold">
-                                          <p:stCondLst>
-                                            <p:cond delay="0"/>
-                                          </p:stCondLst>
-                                        </p:cTn>
-                                        <p:tgtEl>
-                                          <p:spTgt spid="84"/>
-                                        </p:tgtEl>
-                                        <p:attrNameLst>
-                                          <p:attrName>style.visibility</p:attrName>
-                                        </p:attrNameLst>
-                                      </p:cBhvr>
-                                      <p:to>
-                                        <p:strVal val="visible"/>
-                                      </p:to>
-                                    </p:set>
-                                  </p:childTnLst>
-                                </p:cTn>
-                              </p:par>
-                              <p:par>
-                                <p:cTn id="19" presetID="1" presetClass="entr" presetSubtype="0" fill="hold" grpId="0" nodeType="withEffect">
-                                  <p:stCondLst>
-                                    <p:cond delay="0"/>
-                                  </p:stCondLst>
-                                  <p:childTnLst>
-                                    <p:set>
-                                      <p:cBhvr>
-                                        <p:cTn id="20" dur="1" fill="hold">
-                                          <p:stCondLst>
-                                            <p:cond delay="0"/>
-                                          </p:stCondLst>
-                                        </p:cTn>
-                                        <p:tgtEl>
-                                          <p:spTgt spid="87"/>
-                                        </p:tgtEl>
-                                        <p:attrNameLst>
-                                          <p:attrName>style.visibility</p:attrName>
-                                        </p:attrNameLst>
-                                      </p:cBhvr>
-                                      <p:to>
-                                        <p:strVal val="visible"/>
-                                      </p:to>
-                                    </p:set>
-                                  </p:childTnLst>
-                                </p:cTn>
-                              </p:par>
-                              <p:par>
-                                <p:cTn id="21" presetID="1" presetClass="entr" presetSubtype="0" fill="hold" grpId="0" nodeType="withEffect">
-                                  <p:stCondLst>
-                                    <p:cond delay="0"/>
-                                  </p:stCondLst>
-                                  <p:childTnLst>
-                                    <p:set>
-                                      <p:cBhvr>
-                                        <p:cTn id="22" dur="1" fill="hold">
-                                          <p:stCondLst>
-                                            <p:cond delay="0"/>
-                                          </p:stCondLst>
-                                        </p:cTn>
-                                        <p:tgtEl>
-                                          <p:spTgt spid="89"/>
-                                        </p:tgtEl>
-                                        <p:attrNameLst>
-                                          <p:attrName>style.visibility</p:attrName>
-                                        </p:attrNameLst>
-                                      </p:cBhvr>
-                                      <p:to>
-                                        <p:strVal val="visible"/>
-                                      </p:to>
-                                    </p:set>
-                                  </p:childTnLst>
-                                </p:cTn>
-                              </p:par>
-                              <p:par>
-                                <p:cTn id="23" presetID="1" presetClass="entr" presetSubtype="0" fill="hold" grpId="0" nodeType="withEffect">
-                                  <p:stCondLst>
-                                    <p:cond delay="0"/>
-                                  </p:stCondLst>
-                                  <p:childTnLst>
-                                    <p:set>
-                                      <p:cBhvr>
-                                        <p:cTn id="24" dur="1" fill="hold">
-                                          <p:stCondLst>
-                                            <p:cond delay="0"/>
-                                          </p:stCondLst>
-                                        </p:cTn>
-                                        <p:tgtEl>
-                                          <p:spTgt spid="71"/>
-                                        </p:tgtEl>
-                                        <p:attrNameLst>
-                                          <p:attrName>style.visibility</p:attrName>
-                                        </p:attrNameLst>
-                                      </p:cBhvr>
-                                      <p:to>
-                                        <p:strVal val="visible"/>
-                                      </p:to>
-                                    </p:set>
-                                  </p:childTnLst>
-                                </p:cTn>
-                              </p:par>
-                              <p:par>
-                                <p:cTn id="25" presetID="1" presetClass="entr" presetSubtype="0" fill="hold" nodeType="withEffect">
-                                  <p:stCondLst>
-                                    <p:cond delay="0"/>
-                                  </p:stCondLst>
-                                  <p:childTnLst>
-                                    <p:set>
-                                      <p:cBhvr>
-                                        <p:cTn id="26" dur="1" fill="hold">
-                                          <p:stCondLst>
-                                            <p:cond delay="0"/>
-                                          </p:stCondLst>
-                                        </p:cTn>
-                                        <p:tgtEl>
-                                          <p:spTgt spid="66"/>
-                                        </p:tgtEl>
-                                        <p:attrNameLst>
-                                          <p:attrName>style.visibility</p:attrName>
-                                        </p:attrNameLst>
-                                      </p:cBhvr>
-                                      <p:to>
-                                        <p:strVal val="visible"/>
-                                      </p:to>
-                                    </p:set>
-                                  </p:childTnLst>
-                                </p:cTn>
-                              </p:par>
-                              <p:par>
-                                <p:cTn id="27" presetID="1" presetClass="entr" presetSubtype="0" fill="hold" grpId="0" nodeType="withEffect">
-                                  <p:stCondLst>
-                                    <p:cond delay="0"/>
-                                  </p:stCondLst>
-                                  <p:childTnLst>
-                                    <p:set>
-                                      <p:cBhvr>
-                                        <p:cTn id="28" dur="1" fill="hold">
-                                          <p:stCondLst>
-                                            <p:cond delay="0"/>
-                                          </p:stCondLst>
-                                        </p:cTn>
-                                        <p:tgtEl>
-                                          <p:spTgt spid="35"/>
-                                        </p:tgtEl>
-                                        <p:attrNameLst>
-                                          <p:attrName>style.visibility</p:attrName>
-                                        </p:attrNameLst>
-                                      </p:cBhvr>
-                                      <p:to>
-                                        <p:strVal val="visible"/>
-                                      </p:to>
-                                    </p:set>
-                                  </p:childTnLst>
-                                </p:cTn>
-                              </p:par>
-                              <p:par>
-                                <p:cTn id="29" presetID="1" presetClass="entr" presetSubtype="0" fill="hold" nodeType="withEffect">
-                                  <p:stCondLst>
-                                    <p:cond delay="0"/>
-                                  </p:stCondLst>
-                                  <p:childTnLst>
-                                    <p:set>
-                                      <p:cBhvr>
-                                        <p:cTn id="30" dur="1" fill="hold">
-                                          <p:stCondLst>
-                                            <p:cond delay="0"/>
-                                          </p:stCondLst>
-                                        </p:cTn>
-                                        <p:tgtEl>
-                                          <p:spTgt spid="32"/>
-                                        </p:tgtEl>
-                                        <p:attrNameLst>
-                                          <p:attrName>style.visibility</p:attrName>
-                                        </p:attrNameLst>
-                                      </p:cBhvr>
-                                      <p:to>
-                                        <p:strVal val="visible"/>
-                                      </p:to>
-                                    </p:set>
-                                  </p:childTnLst>
-                                </p:cTn>
-                              </p:par>
-                              <p:par>
-                                <p:cTn id="31" presetID="1" presetClass="entr" presetSubtype="0" fill="hold" grpId="0" nodeType="withEffect">
-                                  <p:stCondLst>
-                                    <p:cond delay="0"/>
-                                  </p:stCondLst>
-                                  <p:childTnLst>
-                                    <p:set>
-                                      <p:cBhvr>
-                                        <p:cTn id="32" dur="1" fill="hold">
-                                          <p:stCondLst>
-                                            <p:cond delay="0"/>
-                                          </p:stCondLst>
-                                        </p:cTn>
-                                        <p:tgtEl>
                                           <p:spTgt spid="31"/>
-                                        </p:tgtEl>
-                                        <p:attrNameLst>
-                                          <p:attrName>style.visibility</p:attrName>
-                                        </p:attrNameLst>
-                                      </p:cBhvr>
-                                      <p:to>
-                                        <p:strVal val="visible"/>
-                                      </p:to>
-                                    </p:set>
-                                  </p:childTnLst>
-                                </p:cTn>
-                              </p:par>
-                            </p:childTnLst>
-                          </p:cTn>
-                        </p:par>
-                      </p:childTnLst>
-                    </p:cTn>
-                  </p:par>
-                  <p:par>
-                    <p:cTn id="33" fill="hold">
-                      <p:stCondLst>
-                        <p:cond delay="indefinite"/>
-                      </p:stCondLst>
-                      <p:childTnLst>
-                        <p:par>
-                          <p:cTn id="34" fill="hold">
-                            <p:stCondLst>
-                              <p:cond delay="0"/>
-                            </p:stCondLst>
-                            <p:childTnLst>
-                              <p:par>
-                                <p:cTn id="35" presetID="1" presetClass="entr" presetSubtype="0" fill="hold" nodeType="clickEffect">
-                                  <p:stCondLst>
-                                    <p:cond delay="0"/>
-                                  </p:stCondLst>
-                                  <p:childTnLst>
-                                    <p:set>
-                                      <p:cBhvr>
-                                        <p:cTn id="36" dur="1" fill="hold">
-                                          <p:stCondLst>
-                                            <p:cond delay="0"/>
-                                          </p:stCondLst>
-                                        </p:cTn>
-                                        <p:tgtEl>
-                                          <p:spTgt spid="36"/>
-                                        </p:tgtEl>
-                                        <p:attrNameLst>
-                                          <p:attrName>style.visibility</p:attrName>
-                                        </p:attrNameLst>
-                                      </p:cBhvr>
-                                      <p:to>
-                                        <p:strVal val="visible"/>
-                                      </p:to>
-                                    </p:set>
-                                  </p:childTnLst>
-                                </p:cTn>
-                              </p:par>
-                              <p:par>
-                                <p:cTn id="37" presetID="1" presetClass="entr" presetSubtype="0" fill="hold" grpId="0" nodeType="withEffect">
-                                  <p:stCondLst>
-                                    <p:cond delay="0"/>
-                                  </p:stCondLst>
-                                  <p:childTnLst>
-                                    <p:set>
-                                      <p:cBhvr>
-                                        <p:cTn id="38" dur="1" fill="hold">
-                                          <p:stCondLst>
-                                            <p:cond delay="0"/>
-                                          </p:stCondLst>
-                                        </p:cTn>
-                                        <p:tgtEl>
-                                          <p:spTgt spid="38"/>
                                         </p:tgtEl>
                                         <p:attrNameLst>
                                           <p:attrName>style.visibility</p:attrName>
@@ -5696,15 +5108,9 @@
       </p:par>
     </p:tnLst>
     <p:bldLst>
-      <p:bldP spid="16" grpId="0" animBg="1"/>
-      <p:bldP spid="23" grpId="0" animBg="1"/>
       <p:bldP spid="31" grpId="0" animBg="1"/>
       <p:bldP spid="35" grpId="0" animBg="1"/>
-      <p:bldP spid="44" grpId="0" animBg="1"/>
       <p:bldP spid="71" grpId="0" animBg="1"/>
-      <p:bldP spid="87" grpId="0" animBg="1"/>
-      <p:bldP spid="89" grpId="0" animBg="1"/>
-      <p:bldP spid="38" grpId="0" animBg="1"/>
     </p:bldLst>
   </p:timing>
 </p:sld>

</xml_diff>

<commit_message>
Folie mit UML - Products hinzugefügt
</commit_message>
<xml_diff>
--- a/Dokumentation/grobkonzept.pptx
+++ b/Dokumentation/grobkonzept.pptx
@@ -5,11 +5,12 @@
     <p:sldMasterId id="2147483648" r:id="rId1"/>
   </p:sldMasterIdLst>
   <p:notesMasterIdLst>
-    <p:notesMasterId r:id="rId4"/>
+    <p:notesMasterId r:id="rId5"/>
   </p:notesMasterIdLst>
   <p:sldIdLst>
     <p:sldId id="257" r:id="rId2"/>
     <p:sldId id="256" r:id="rId3"/>
+    <p:sldId id="258" r:id="rId4"/>
   </p:sldIdLst>
   <p:sldSz cx="12192000" cy="6858000"/>
   <p:notesSz cx="6858000" cy="9144000"/>
@@ -4912,6 +4913,85 @@
           </a:p>
         </p:txBody>
       </p:sp>
+      <p:cxnSp>
+        <p:nvCxnSpPr>
+          <p:cNvPr id="4" name="Gerade Verbindung mit Pfeil 3">
+            <a:extLst>
+              <a:ext uri="{FF2B5EF4-FFF2-40B4-BE49-F238E27FC236}">
+                <a16:creationId xmlns:a16="http://schemas.microsoft.com/office/drawing/2014/main" id="{680AB2C5-E74B-402B-BC6A-D7FBD85D643D}"/>
+              </a:ext>
+            </a:extLst>
+          </p:cNvPr>
+          <p:cNvCxnSpPr/>
+          <p:nvPr/>
+        </p:nvCxnSpPr>
+        <p:spPr>
+          <a:xfrm>
+            <a:off x="1566787" y="2504662"/>
+            <a:ext cx="8595360" cy="0"/>
+          </a:xfrm>
+          <a:prstGeom prst="straightConnector1">
+            <a:avLst/>
+          </a:prstGeom>
+          <a:ln w="76200">
+            <a:solidFill>
+              <a:schemeClr val="bg1">
+                <a:lumMod val="50000"/>
+              </a:schemeClr>
+            </a:solidFill>
+            <a:tailEnd type="triangle"/>
+          </a:ln>
+        </p:spPr>
+        <p:style>
+          <a:lnRef idx="1">
+            <a:schemeClr val="accent1"/>
+          </a:lnRef>
+          <a:fillRef idx="0">
+            <a:schemeClr val="accent1"/>
+          </a:fillRef>
+          <a:effectRef idx="0">
+            <a:schemeClr val="accent1"/>
+          </a:effectRef>
+          <a:fontRef idx="minor">
+            <a:schemeClr val="tx1"/>
+          </a:fontRef>
+        </p:style>
+      </p:cxnSp>
+      <p:sp>
+        <p:nvSpPr>
+          <p:cNvPr id="7" name="Textfeld 6">
+            <a:extLst>
+              <a:ext uri="{FF2B5EF4-FFF2-40B4-BE49-F238E27FC236}">
+                <a16:creationId xmlns:a16="http://schemas.microsoft.com/office/drawing/2014/main" id="{6FB06F71-E9D9-4435-8528-078385F08CDD}"/>
+              </a:ext>
+            </a:extLst>
+          </p:cNvPr>
+          <p:cNvSpPr txBox="1"/>
+          <p:nvPr/>
+        </p:nvSpPr>
+        <p:spPr>
+          <a:xfrm>
+            <a:off x="4887171" y="2125035"/>
+            <a:ext cx="1159292" cy="369332"/>
+          </a:xfrm>
+          <a:prstGeom prst="rect">
+            <a:avLst/>
+          </a:prstGeom>
+          <a:noFill/>
+        </p:spPr>
+        <p:txBody>
+          <a:bodyPr wrap="none" rtlCol="0">
+            <a:spAutoFit/>
+          </a:bodyPr>
+          <a:lstStyle/>
+          <a:p>
+            <a:r>
+              <a:rPr lang="de-DE" dirty="0"/>
+              <a:t>Fortschritt</a:t>
+            </a:r>
+          </a:p>
+        </p:txBody>
+      </p:sp>
     </p:spTree>
     <p:extLst>
       <p:ext uri="{BB962C8B-B14F-4D97-AF65-F5344CB8AC3E}">
@@ -5113,6 +5193,72 @@
       <p:bldP spid="71" grpId="0" animBg="1"/>
     </p:bldLst>
   </p:timing>
+</p:sld>
+</file>
+
+<file path=ppt/slides/slide3.xml><?xml version="1.0" encoding="utf-8"?>
+<p:sld xmlns:a="http://schemas.openxmlformats.org/drawingml/2006/main" xmlns:r="http://schemas.openxmlformats.org/officeDocument/2006/relationships" xmlns:p="http://schemas.openxmlformats.org/presentationml/2006/main">
+  <p:cSld>
+    <p:spTree>
+      <p:nvGrpSpPr>
+        <p:cNvPr id="1" name=""/>
+        <p:cNvGrpSpPr/>
+        <p:nvPr/>
+      </p:nvGrpSpPr>
+      <p:grpSpPr>
+        <a:xfrm>
+          <a:off x="0" y="0"/>
+          <a:ext cx="0" cy="0"/>
+          <a:chOff x="0" y="0"/>
+          <a:chExt cx="0" cy="0"/>
+        </a:xfrm>
+      </p:grpSpPr>
+      <p:pic>
+        <p:nvPicPr>
+          <p:cNvPr id="9" name="Grafik 8">
+            <a:extLst>
+              <a:ext uri="{FF2B5EF4-FFF2-40B4-BE49-F238E27FC236}">
+                <a16:creationId xmlns:a16="http://schemas.microsoft.com/office/drawing/2014/main" id="{C217F316-27CF-4C84-A2D0-7EE17149123F}"/>
+              </a:ext>
+            </a:extLst>
+          </p:cNvPr>
+          <p:cNvPicPr>
+            <a:picLocks noChangeAspect="1"/>
+          </p:cNvPicPr>
+          <p:nvPr/>
+        </p:nvPicPr>
+        <p:blipFill>
+          <a:blip r:embed="rId2">
+            <a:extLst>
+              <a:ext uri="{28A0092B-C50C-407E-A947-70E740481C1C}">
+                <a14:useLocalDpi xmlns:a14="http://schemas.microsoft.com/office/drawing/2010/main" val="0"/>
+              </a:ext>
+            </a:extLst>
+          </a:blip>
+          <a:stretch>
+            <a:fillRect/>
+          </a:stretch>
+        </p:blipFill>
+        <p:spPr>
+          <a:xfrm>
+            <a:off x="72571" y="0"/>
+            <a:ext cx="12046857" cy="6858000"/>
+          </a:xfrm>
+          <a:prstGeom prst="rect">
+            <a:avLst/>
+          </a:prstGeom>
+        </p:spPr>
+      </p:pic>
+    </p:spTree>
+    <p:extLst>
+      <p:ext uri="{BB962C8B-B14F-4D97-AF65-F5344CB8AC3E}">
+        <p14:creationId xmlns:p14="http://schemas.microsoft.com/office/powerpoint/2010/main" val="1507135799"/>
+      </p:ext>
+    </p:extLst>
+  </p:cSld>
+  <p:clrMapOvr>
+    <a:masterClrMapping/>
+  </p:clrMapOvr>
 </p:sld>
 </file>
 

</xml_diff>

<commit_message>
UML Diagramm: Produkte geändert
</commit_message>
<xml_diff>
--- a/Dokumentation/grobkonzept.pptx
+++ b/Dokumentation/grobkonzept.pptx
@@ -5213,12 +5213,47 @@
           <a:chExt cx="0" cy="0"/>
         </a:xfrm>
       </p:grpSpPr>
+      <p:sp>
+        <p:nvSpPr>
+          <p:cNvPr id="10" name="Textfeld 9">
+            <a:extLst>
+              <a:ext uri="{FF2B5EF4-FFF2-40B4-BE49-F238E27FC236}">
+                <a16:creationId xmlns:a16="http://schemas.microsoft.com/office/drawing/2014/main" id="{2266428C-6297-49B0-87B6-D51BC70E2E17}"/>
+              </a:ext>
+            </a:extLst>
+          </p:cNvPr>
+          <p:cNvSpPr txBox="1"/>
+          <p:nvPr/>
+        </p:nvSpPr>
+        <p:spPr>
+          <a:xfrm>
+            <a:off x="4998823" y="127221"/>
+            <a:ext cx="2381421" cy="492443"/>
+          </a:xfrm>
+          <a:prstGeom prst="rect">
+            <a:avLst/>
+          </a:prstGeom>
+          <a:noFill/>
+        </p:spPr>
+        <p:txBody>
+          <a:bodyPr wrap="none" rtlCol="0">
+            <a:spAutoFit/>
+          </a:bodyPr>
+          <a:lstStyle/>
+          <a:p>
+            <a:r>
+              <a:rPr lang="de-DE" sz="2600" u="sng" dirty="0"/>
+              <a:t>Modul Produkte</a:t>
+            </a:r>
+          </a:p>
+        </p:txBody>
+      </p:sp>
       <p:pic>
         <p:nvPicPr>
-          <p:cNvPr id="9" name="Grafik 8">
-            <a:extLst>
-              <a:ext uri="{FF2B5EF4-FFF2-40B4-BE49-F238E27FC236}">
-                <a16:creationId xmlns:a16="http://schemas.microsoft.com/office/drawing/2014/main" id="{C217F316-27CF-4C84-A2D0-7EE17149123F}"/>
+          <p:cNvPr id="5" name="Grafik 4">
+            <a:extLst>
+              <a:ext uri="{FF2B5EF4-FFF2-40B4-BE49-F238E27FC236}">
+                <a16:creationId xmlns:a16="http://schemas.microsoft.com/office/drawing/2014/main" id="{C803E0B2-7BC7-4F47-B07B-E5A9DA9C2480}"/>
               </a:ext>
             </a:extLst>
           </p:cNvPr>
@@ -5241,8 +5276,8 @@
         </p:blipFill>
         <p:spPr>
           <a:xfrm>
-            <a:off x="72571" y="0"/>
-            <a:ext cx="12046857" cy="6858000"/>
+            <a:off x="2942763" y="619664"/>
+            <a:ext cx="6306473" cy="6238336"/>
           </a:xfrm>
           <a:prstGeom prst="rect">
             <a:avLst/>

</xml_diff>